<commit_message>
added related work and misc
</commit_message>
<xml_diff>
--- a/Presentation.pptx
+++ b/Presentation.pptx
@@ -5,7 +5,7 @@
     <p:sldMasterId id="2147483660" r:id="rId1"/>
   </p:sldMasterIdLst>
   <p:notesMasterIdLst>
-    <p:notesMasterId r:id="rId30"/>
+    <p:notesMasterId r:id="rId31"/>
   </p:notesMasterIdLst>
   <p:sldIdLst>
     <p:sldId id="257" r:id="rId2"/>
@@ -34,8 +34,9 @@
     <p:sldId id="280" r:id="rId25"/>
     <p:sldId id="281" r:id="rId26"/>
     <p:sldId id="282" r:id="rId27"/>
-    <p:sldId id="283" r:id="rId28"/>
-    <p:sldId id="284" r:id="rId29"/>
+    <p:sldId id="286" r:id="rId28"/>
+    <p:sldId id="283" r:id="rId29"/>
+    <p:sldId id="284" r:id="rId30"/>
   </p:sldIdLst>
   <p:sldSz cx="9144000" cy="6858000" type="screen4x3"/>
   <p:notesSz cx="6858000" cy="9144000"/>
@@ -219,7 +220,8 @@
           <a:p>
             <a:fld id="{207F67E2-BC33-4390-A713-7764078C3DC6}" type="datetimeFigureOut">
               <a:rPr lang="en-US" smtClean="0"/>
-              <a:t>8/10/2014</a:t>
+              <a:pPr/>
+              <a:t>8/11/2014</a:t>
             </a:fld>
             <a:endParaRPr lang="en-US"/>
           </a:p>
@@ -380,6 +382,7 @@
           <a:p>
             <a:fld id="{0EF9D611-C987-46DA-8C64-52388E2C9313}" type="slidenum">
               <a:rPr lang="en-US" smtClean="0"/>
+              <a:pPr/>
               <a:t>‹#›</a:t>
             </a:fld>
             <a:endParaRPr lang="en-US"/>
@@ -665,7 +668,7 @@
     </p:spTree>
     <p:extLst>
       <p:ext uri="{BB962C8B-B14F-4D97-AF65-F5344CB8AC3E}">
-        <p14:creationId xmlns:p14="http://schemas.microsoft.com/office/powerpoint/2010/main" xmlns="" val="2616020464"/>
+        <p14:creationId xmlns="" xmlns:p14="http://schemas.microsoft.com/office/powerpoint/2010/main" val="2616020464"/>
       </p:ext>
     </p:extLst>
   </p:cSld>
@@ -808,7 +811,7 @@
     </p:spTree>
     <p:extLst>
       <p:ext uri="{BB962C8B-B14F-4D97-AF65-F5344CB8AC3E}">
-        <p14:creationId xmlns:p14="http://schemas.microsoft.com/office/powerpoint/2010/main" xmlns="" val="1814285152"/>
+        <p14:creationId xmlns="" xmlns:p14="http://schemas.microsoft.com/office/powerpoint/2010/main" val="1814285152"/>
       </p:ext>
     </p:extLst>
   </p:cSld>
@@ -916,7 +919,7 @@
     </p:spTree>
     <p:extLst>
       <p:ext uri="{BB962C8B-B14F-4D97-AF65-F5344CB8AC3E}">
-        <p14:creationId xmlns:p14="http://schemas.microsoft.com/office/powerpoint/2010/main" xmlns="" val="1814285152"/>
+        <p14:creationId xmlns="" xmlns:p14="http://schemas.microsoft.com/office/powerpoint/2010/main" val="1814285152"/>
       </p:ext>
     </p:extLst>
   </p:cSld>
@@ -1001,7 +1004,7 @@
     </p:spTree>
     <p:extLst>
       <p:ext uri="{BB962C8B-B14F-4D97-AF65-F5344CB8AC3E}">
-        <p14:creationId xmlns:p14="http://schemas.microsoft.com/office/powerpoint/2010/main" xmlns="" val="2532089183"/>
+        <p14:creationId xmlns="" xmlns:p14="http://schemas.microsoft.com/office/powerpoint/2010/main" val="2532089183"/>
       </p:ext>
     </p:extLst>
   </p:cSld>
@@ -1118,7 +1121,7 @@
     </p:spTree>
     <p:extLst>
       <p:ext uri="{BB962C8B-B14F-4D97-AF65-F5344CB8AC3E}">
-        <p14:creationId xmlns:p14="http://schemas.microsoft.com/office/powerpoint/2010/main" xmlns="" val="3122826242"/>
+        <p14:creationId xmlns="" xmlns:p14="http://schemas.microsoft.com/office/powerpoint/2010/main" val="3122826242"/>
       </p:ext>
     </p:extLst>
   </p:cSld>
@@ -1207,7 +1210,7 @@
     </p:spTree>
     <p:extLst>
       <p:ext uri="{BB962C8B-B14F-4D97-AF65-F5344CB8AC3E}">
-        <p14:creationId xmlns:p14="http://schemas.microsoft.com/office/powerpoint/2010/main" xmlns="" val="4226265490"/>
+        <p14:creationId xmlns="" xmlns:p14="http://schemas.microsoft.com/office/powerpoint/2010/main" val="4226265490"/>
       </p:ext>
     </p:extLst>
   </p:cSld>
@@ -1309,7 +1312,7 @@
     </p:spTree>
     <p:extLst>
       <p:ext uri="{BB962C8B-B14F-4D97-AF65-F5344CB8AC3E}">
-        <p14:creationId xmlns:p14="http://schemas.microsoft.com/office/powerpoint/2010/main" xmlns="" val="3969599817"/>
+        <p14:creationId xmlns="" xmlns:p14="http://schemas.microsoft.com/office/powerpoint/2010/main" val="3969599817"/>
       </p:ext>
     </p:extLst>
   </p:cSld>
@@ -1413,7 +1416,7 @@
     </p:spTree>
     <p:extLst>
       <p:ext uri="{BB962C8B-B14F-4D97-AF65-F5344CB8AC3E}">
-        <p14:creationId xmlns:p14="http://schemas.microsoft.com/office/powerpoint/2010/main" xmlns="" val="1138807512"/>
+        <p14:creationId xmlns="" xmlns:p14="http://schemas.microsoft.com/office/powerpoint/2010/main" val="1138807512"/>
       </p:ext>
     </p:extLst>
   </p:cSld>
@@ -1586,7 +1589,7 @@
     </p:spTree>
     <p:extLst>
       <p:ext uri="{BB962C8B-B14F-4D97-AF65-F5344CB8AC3E}">
-        <p14:creationId xmlns:p14="http://schemas.microsoft.com/office/powerpoint/2010/main" xmlns="" val="1138807512"/>
+        <p14:creationId xmlns="" xmlns:p14="http://schemas.microsoft.com/office/powerpoint/2010/main" val="1138807512"/>
       </p:ext>
     </p:extLst>
   </p:cSld>
@@ -1718,7 +1721,7 @@
     </p:spTree>
     <p:extLst>
       <p:ext uri="{BB962C8B-B14F-4D97-AF65-F5344CB8AC3E}">
-        <p14:creationId xmlns:p14="http://schemas.microsoft.com/office/powerpoint/2010/main" xmlns="" val="4003186642"/>
+        <p14:creationId xmlns="" xmlns:p14="http://schemas.microsoft.com/office/powerpoint/2010/main" val="4003186642"/>
       </p:ext>
     </p:extLst>
   </p:cSld>
@@ -1840,7 +1843,7 @@
     </p:spTree>
     <p:extLst>
       <p:ext uri="{BB962C8B-B14F-4D97-AF65-F5344CB8AC3E}">
-        <p14:creationId xmlns:p14="http://schemas.microsoft.com/office/powerpoint/2010/main" xmlns="" val="3695432560"/>
+        <p14:creationId xmlns="" xmlns:p14="http://schemas.microsoft.com/office/powerpoint/2010/main" val="3695432560"/>
       </p:ext>
     </p:extLst>
   </p:cSld>
@@ -1942,6 +1945,7 @@
           <a:p>
             <a:fld id="{0EF9D611-C987-46DA-8C64-52388E2C9313}" type="slidenum">
               <a:rPr lang="en-US" smtClean="0"/>
+              <a:pPr/>
               <a:t>2</a:t>
             </a:fld>
             <a:endParaRPr lang="en-US"/>
@@ -2048,7 +2052,7 @@
     </p:spTree>
     <p:extLst>
       <p:ext uri="{BB962C8B-B14F-4D97-AF65-F5344CB8AC3E}">
-        <p14:creationId xmlns:p14="http://schemas.microsoft.com/office/powerpoint/2010/main" xmlns="" val="3804480766"/>
+        <p14:creationId xmlns="" xmlns:p14="http://schemas.microsoft.com/office/powerpoint/2010/main" val="3804480766"/>
       </p:ext>
     </p:extLst>
   </p:cSld>
@@ -2189,7 +2193,7 @@
     </p:spTree>
     <p:extLst>
       <p:ext uri="{BB962C8B-B14F-4D97-AF65-F5344CB8AC3E}">
-        <p14:creationId xmlns:p14="http://schemas.microsoft.com/office/powerpoint/2010/main" xmlns="" val="190619522"/>
+        <p14:creationId xmlns="" xmlns:p14="http://schemas.microsoft.com/office/powerpoint/2010/main" val="190619522"/>
       </p:ext>
     </p:extLst>
   </p:cSld>
@@ -2352,7 +2356,7 @@
     </p:spTree>
     <p:extLst>
       <p:ext uri="{BB962C8B-B14F-4D97-AF65-F5344CB8AC3E}">
-        <p14:creationId xmlns:p14="http://schemas.microsoft.com/office/powerpoint/2010/main" xmlns="" val="261277375"/>
+        <p14:creationId xmlns="" xmlns:p14="http://schemas.microsoft.com/office/powerpoint/2010/main" val="261277375"/>
       </p:ext>
     </p:extLst>
   </p:cSld>
@@ -2450,7 +2454,7 @@
     </p:spTree>
     <p:extLst>
       <p:ext uri="{BB962C8B-B14F-4D97-AF65-F5344CB8AC3E}">
-        <p14:creationId xmlns:p14="http://schemas.microsoft.com/office/powerpoint/2010/main" xmlns="" val="261277375"/>
+        <p14:creationId xmlns="" xmlns:p14="http://schemas.microsoft.com/office/powerpoint/2010/main" val="261277375"/>
       </p:ext>
     </p:extLst>
   </p:cSld>
@@ -2565,7 +2569,7 @@
     </p:spTree>
     <p:extLst>
       <p:ext uri="{BB962C8B-B14F-4D97-AF65-F5344CB8AC3E}">
-        <p14:creationId xmlns:p14="http://schemas.microsoft.com/office/powerpoint/2010/main" xmlns="" val="3064807093"/>
+        <p14:creationId xmlns="" xmlns:p14="http://schemas.microsoft.com/office/powerpoint/2010/main" val="3064807093"/>
       </p:ext>
     </p:extLst>
   </p:cSld>
@@ -2641,7 +2645,7 @@
             <a:fld id="{D8B9C5E5-C74D-45CE-98A8-F845005B90CF}" type="slidenum">
               <a:rPr lang="en-US" smtClean="0"/>
               <a:pPr/>
-              <a:t>28</a:t>
+              <a:t>29</a:t>
             </a:fld>
             <a:endParaRPr lang="en-US"/>
           </a:p>
@@ -2650,7 +2654,7 @@
     </p:spTree>
     <p:extLst>
       <p:ext uri="{BB962C8B-B14F-4D97-AF65-F5344CB8AC3E}">
-        <p14:creationId xmlns:p14="http://schemas.microsoft.com/office/powerpoint/2010/main" xmlns="" val="3103055361"/>
+        <p14:creationId xmlns="" xmlns:p14="http://schemas.microsoft.com/office/powerpoint/2010/main" val="3103055361"/>
       </p:ext>
     </p:extLst>
   </p:cSld>
@@ -2797,7 +2801,7 @@
     </p:spTree>
     <p:extLst>
       <p:ext uri="{BB962C8B-B14F-4D97-AF65-F5344CB8AC3E}">
-        <p14:creationId xmlns:p14="http://schemas.microsoft.com/office/powerpoint/2010/main" xmlns="" val="494263274"/>
+        <p14:creationId xmlns="" xmlns:p14="http://schemas.microsoft.com/office/powerpoint/2010/main" val="494263274"/>
       </p:ext>
     </p:extLst>
   </p:cSld>
@@ -2983,7 +2987,7 @@
     </p:spTree>
     <p:extLst>
       <p:ext uri="{BB962C8B-B14F-4D97-AF65-F5344CB8AC3E}">
-        <p14:creationId xmlns:p14="http://schemas.microsoft.com/office/powerpoint/2010/main" xmlns="" val="494263274"/>
+        <p14:creationId xmlns="" xmlns:p14="http://schemas.microsoft.com/office/powerpoint/2010/main" val="494263274"/>
       </p:ext>
     </p:extLst>
   </p:cSld>
@@ -3187,7 +3191,7 @@
     </p:spTree>
     <p:extLst>
       <p:ext uri="{BB962C8B-B14F-4D97-AF65-F5344CB8AC3E}">
-        <p14:creationId xmlns:p14="http://schemas.microsoft.com/office/powerpoint/2010/main" xmlns="" val="494263274"/>
+        <p14:creationId xmlns="" xmlns:p14="http://schemas.microsoft.com/office/powerpoint/2010/main" val="494263274"/>
       </p:ext>
     </p:extLst>
   </p:cSld>
@@ -3428,7 +3432,7 @@
     </p:spTree>
     <p:extLst>
       <p:ext uri="{BB962C8B-B14F-4D97-AF65-F5344CB8AC3E}">
-        <p14:creationId xmlns:p14="http://schemas.microsoft.com/office/powerpoint/2010/main" xmlns="" val="494263274"/>
+        <p14:creationId xmlns="" xmlns:p14="http://schemas.microsoft.com/office/powerpoint/2010/main" val="494263274"/>
       </p:ext>
     </p:extLst>
   </p:cSld>
@@ -3569,7 +3573,7 @@
     </p:spTree>
     <p:extLst>
       <p:ext uri="{BB962C8B-B14F-4D97-AF65-F5344CB8AC3E}">
-        <p14:creationId xmlns:p14="http://schemas.microsoft.com/office/powerpoint/2010/main" xmlns="" val="494263274"/>
+        <p14:creationId xmlns="" xmlns:p14="http://schemas.microsoft.com/office/powerpoint/2010/main" val="494263274"/>
       </p:ext>
     </p:extLst>
   </p:cSld>
@@ -3693,7 +3697,7 @@
     </p:spTree>
     <p:extLst>
       <p:ext uri="{BB962C8B-B14F-4D97-AF65-F5344CB8AC3E}">
-        <p14:creationId xmlns:p14="http://schemas.microsoft.com/office/powerpoint/2010/main" xmlns="" val="3117802984"/>
+        <p14:creationId xmlns="" xmlns:p14="http://schemas.microsoft.com/office/powerpoint/2010/main" val="3117802984"/>
       </p:ext>
     </p:extLst>
   </p:cSld>
@@ -3885,7 +3889,7 @@
     </p:spTree>
     <p:extLst>
       <p:ext uri="{BB962C8B-B14F-4D97-AF65-F5344CB8AC3E}">
-        <p14:creationId xmlns:p14="http://schemas.microsoft.com/office/powerpoint/2010/main" xmlns="" val="1038479702"/>
+        <p14:creationId xmlns="" xmlns:p14="http://schemas.microsoft.com/office/powerpoint/2010/main" val="1038479702"/>
       </p:ext>
     </p:extLst>
   </p:cSld>
@@ -4039,7 +4043,7 @@
             <a:fld id="{ACDF6120-F1F0-4C60-9FE9-39AC71A9C79D}" type="datetimeFigureOut">
               <a:rPr lang="en-US" smtClean="0"/>
               <a:pPr/>
-              <a:t>8/10/2014</a:t>
+              <a:t>8/11/2014</a:t>
             </a:fld>
             <a:endParaRPr lang="en-US" sz="1600" dirty="0"/>
           </a:p>
@@ -4400,7 +4404,7 @@
             <a:fld id="{ACDF6120-F1F0-4C60-9FE9-39AC71A9C79D}" type="datetimeFigureOut">
               <a:rPr lang="en-US" smtClean="0"/>
               <a:pPr/>
-              <a:t>8/10/2014</a:t>
+              <a:t>8/11/2014</a:t>
             </a:fld>
             <a:endParaRPr lang="en-US"/>
           </a:p>
@@ -4577,7 +4581,7 @@
             <a:fld id="{ACDF6120-F1F0-4C60-9FE9-39AC71A9C79D}" type="datetimeFigureOut">
               <a:rPr lang="en-US" smtClean="0"/>
               <a:pPr/>
-              <a:t>8/10/2014</a:t>
+              <a:t>8/11/2014</a:t>
             </a:fld>
             <a:endParaRPr lang="en-US"/>
           </a:p>
@@ -4814,7 +4818,7 @@
             <a:fld id="{ACDF6120-F1F0-4C60-9FE9-39AC71A9C79D}" type="datetimeFigureOut">
               <a:rPr lang="en-US" smtClean="0"/>
               <a:pPr/>
-              <a:t>8/10/2014</a:t>
+              <a:t>8/11/2014</a:t>
             </a:fld>
             <a:endParaRPr lang="en-US" dirty="0"/>
           </a:p>
@@ -5085,7 +5089,7 @@
             <a:fld id="{ACDF6120-F1F0-4C60-9FE9-39AC71A9C79D}" type="datetimeFigureOut">
               <a:rPr lang="en-US" smtClean="0"/>
               <a:pPr/>
-              <a:t>8/10/2014</a:t>
+              <a:t>8/11/2014</a:t>
             </a:fld>
             <a:endParaRPr lang="en-US" dirty="0"/>
           </a:p>
@@ -5307,7 +5311,7 @@
             <a:fld id="{ACDF6120-F1F0-4C60-9FE9-39AC71A9C79D}" type="datetimeFigureOut">
               <a:rPr lang="en-US" smtClean="0"/>
               <a:pPr/>
-              <a:t>8/10/2014</a:t>
+              <a:t>8/11/2014</a:t>
             </a:fld>
             <a:endParaRPr lang="en-US"/>
           </a:p>
@@ -5661,7 +5665,7 @@
             <a:fld id="{ACDF6120-F1F0-4C60-9FE9-39AC71A9C79D}" type="datetimeFigureOut">
               <a:rPr lang="en-US" smtClean="0"/>
               <a:pPr/>
-              <a:t>8/10/2014</a:t>
+              <a:t>8/11/2014</a:t>
             </a:fld>
             <a:endParaRPr lang="en-US"/>
           </a:p>
@@ -5895,7 +5899,7 @@
             <a:fld id="{ACDF6120-F1F0-4C60-9FE9-39AC71A9C79D}" type="datetimeFigureOut">
               <a:rPr lang="en-US" smtClean="0"/>
               <a:pPr/>
-              <a:t>8/10/2014</a:t>
+              <a:t>8/11/2014</a:t>
             </a:fld>
             <a:endParaRPr lang="en-US"/>
           </a:p>
@@ -6037,7 +6041,7 @@
             <a:fld id="{ACDF6120-F1F0-4C60-9FE9-39AC71A9C79D}" type="datetimeFigureOut">
               <a:rPr lang="en-US" smtClean="0"/>
               <a:pPr/>
-              <a:t>8/10/2014</a:t>
+              <a:t>8/11/2014</a:t>
             </a:fld>
             <a:endParaRPr lang="en-US"/>
           </a:p>
@@ -6316,7 +6320,7 @@
             <a:fld id="{ACDF6120-F1F0-4C60-9FE9-39AC71A9C79D}" type="datetimeFigureOut">
               <a:rPr lang="en-US" smtClean="0"/>
               <a:pPr/>
-              <a:t>8/10/2014</a:t>
+              <a:t>8/11/2014</a:t>
             </a:fld>
             <a:endParaRPr lang="en-US"/>
           </a:p>
@@ -6725,7 +6729,7 @@
             <a:fld id="{ACDF6120-F1F0-4C60-9FE9-39AC71A9C79D}" type="datetimeFigureOut">
               <a:rPr lang="en-US" smtClean="0"/>
               <a:pPr/>
-              <a:t>8/10/2014</a:t>
+              <a:t>8/11/2014</a:t>
             </a:fld>
             <a:endParaRPr lang="en-US"/>
           </a:p>
@@ -7065,7 +7069,7 @@
             <a:fld id="{ACDF6120-F1F0-4C60-9FE9-39AC71A9C79D}" type="datetimeFigureOut">
               <a:rPr lang="en-US" smtClean="0"/>
               <a:pPr/>
-              <a:t>8/10/2014</a:t>
+              <a:t>8/11/2014</a:t>
             </a:fld>
             <a:endParaRPr lang="en-US" sz="1400" dirty="0">
               <a:solidFill>
@@ -7712,40 +7716,15 @@
                 <a:latin typeface="Neo Sans Intel" pitchFamily="34" charset="0"/>
                 <a:cs typeface="Arial" pitchFamily="34" charset="0"/>
               </a:rPr>
-              <a:t>Masters Thesis By Ohad </a:t>
-            </a:r>
-            <a:r>
-              <a:rPr lang="en-US" b="1" dirty="0" smtClean="0">
-                <a:latin typeface="Neo Sans Intel" pitchFamily="34" charset="0"/>
-                <a:cs typeface="Arial" pitchFamily="34" charset="0"/>
-              </a:rPr>
-              <a:t>Shai, Supervised by</a:t>
+              <a:t>Masters Thesis By Ohad Shai, Supervised by</a:t>
             </a:r>
             <a:r>
               <a:rPr lang="en-US" sz="2000" b="1" dirty="0" smtClean="0">
                 <a:latin typeface="Neo Sans Intel" pitchFamily="34" charset="0"/>
                 <a:cs typeface="Arial" pitchFamily="34" charset="0"/>
               </a:rPr>
-              <a:t> </a:t>
-            </a:r>
-            <a:r>
-              <a:rPr lang="en-US" sz="2000" b="1" dirty="0" smtClean="0">
-                <a:latin typeface="Neo Sans Intel" pitchFamily="34" charset="0"/>
-                <a:cs typeface="Arial" pitchFamily="34" charset="0"/>
-              </a:rPr>
-              <a:t>Prof.  Dror G. </a:t>
-            </a:r>
-            <a:r>
-              <a:rPr lang="en-US" sz="2000" b="1" dirty="0" smtClean="0">
-                <a:latin typeface="Neo Sans Intel" pitchFamily="34" charset="0"/>
-                <a:cs typeface="Arial" pitchFamily="34" charset="0"/>
-              </a:rPr>
-              <a:t>Feitelson</a:t>
-            </a:r>
-            <a:endParaRPr lang="en-US" sz="2000" b="1" dirty="0" smtClean="0">
-              <a:latin typeface="Neo Sans Intel" pitchFamily="34" charset="0"/>
-              <a:cs typeface="Arial" pitchFamily="34" charset="0"/>
-            </a:endParaRPr>
+              <a:t> Prof.  Dror G. Feitelson</a:t>
+            </a:r>
           </a:p>
           <a:p>
             <a:pPr algn="l"/>
@@ -8026,7 +8005,7 @@
           <a:blip r:embed="rId3" cstate="print">
             <a:extLst>
               <a:ext uri="{28A0092B-C50C-407E-A947-70E740481C1C}">
-                <a14:useLocalDpi xmlns:a14="http://schemas.microsoft.com/office/drawing/2010/main" xmlns="" val="0"/>
+                <a14:useLocalDpi xmlns="" xmlns:a14="http://schemas.microsoft.com/office/drawing/2010/main" val="0"/>
               </a:ext>
             </a:extLst>
           </a:blip>
@@ -8050,14 +8029,14 @@
           <a:effectLst/>
           <a:extLst>
             <a:ext uri="{909E8E84-426E-40DD-AFC4-6F175D3DCCD1}">
-              <a14:hiddenFill xmlns:a14="http://schemas.microsoft.com/office/drawing/2010/main" xmlns="">
+              <a14:hiddenFill xmlns="" xmlns:a14="http://schemas.microsoft.com/office/drawing/2010/main">
                 <a:solidFill>
                   <a:schemeClr val="accent1"/>
                 </a:solidFill>
               </a14:hiddenFill>
             </a:ext>
             <a:ext uri="{91240B29-F687-4F45-9708-019B960494DF}">
-              <a14:hiddenLine xmlns:a14="http://schemas.microsoft.com/office/drawing/2010/main" xmlns="" w="9525">
+              <a14:hiddenLine xmlns="" xmlns:a14="http://schemas.microsoft.com/office/drawing/2010/main" w="9525">
                 <a:solidFill>
                   <a:schemeClr val="tx1"/>
                 </a:solidFill>
@@ -8067,7 +8046,7 @@
               </a14:hiddenLine>
             </a:ext>
             <a:ext uri="{AF507438-7753-43E0-B8FC-AC1667EBCBE1}">
-              <a14:hiddenEffects xmlns:a14="http://schemas.microsoft.com/office/drawing/2010/main" xmlns="">
+              <a14:hiddenEffects xmlns="" xmlns:a14="http://schemas.microsoft.com/office/drawing/2010/main">
                 <a:effectLst>
                   <a:outerShdw dist="35921" dir="2700000" algn="ctr" rotWithShape="0">
                     <a:schemeClr val="bg2"/>
@@ -8081,7 +8060,7 @@
     </p:spTree>
     <p:extLst>
       <p:ext uri="{BB962C8B-B14F-4D97-AF65-F5344CB8AC3E}">
-        <p14:creationId xmlns:p14="http://schemas.microsoft.com/office/powerpoint/2010/main" xmlns="" val="156881095"/>
+        <p14:creationId xmlns="" xmlns:p14="http://schemas.microsoft.com/office/powerpoint/2010/main" val="156881095"/>
       </p:ext>
     </p:extLst>
   </p:cSld>
@@ -8348,7 +8327,7 @@
           <a:blip r:embed="rId3" cstate="print">
             <a:extLst>
               <a:ext uri="{28A0092B-C50C-407E-A947-70E740481C1C}">
-                <a14:useLocalDpi xmlns:a14="http://schemas.microsoft.com/office/drawing/2010/main" xmlns="" val="0"/>
+                <a14:useLocalDpi xmlns="" xmlns:a14="http://schemas.microsoft.com/office/drawing/2010/main" val="0"/>
               </a:ext>
             </a:extLst>
           </a:blip>
@@ -8372,14 +8351,14 @@
           <a:effectLst/>
           <a:extLst>
             <a:ext uri="{909E8E84-426E-40DD-AFC4-6F175D3DCCD1}">
-              <a14:hiddenFill xmlns:a14="http://schemas.microsoft.com/office/drawing/2010/main" xmlns="">
+              <a14:hiddenFill xmlns="" xmlns:a14="http://schemas.microsoft.com/office/drawing/2010/main">
                 <a:solidFill>
                   <a:schemeClr val="accent1"/>
                 </a:solidFill>
               </a14:hiddenFill>
             </a:ext>
             <a:ext uri="{91240B29-F687-4F45-9708-019B960494DF}">
-              <a14:hiddenLine xmlns:a14="http://schemas.microsoft.com/office/drawing/2010/main" xmlns="" w="9525">
+              <a14:hiddenLine xmlns="" xmlns:a14="http://schemas.microsoft.com/office/drawing/2010/main" w="9525">
                 <a:solidFill>
                   <a:schemeClr val="tx1"/>
                 </a:solidFill>
@@ -8389,7 +8368,7 @@
               </a14:hiddenLine>
             </a:ext>
             <a:ext uri="{AF507438-7753-43E0-B8FC-AC1667EBCBE1}">
-              <a14:hiddenEffects xmlns:a14="http://schemas.microsoft.com/office/drawing/2010/main" xmlns="">
+              <a14:hiddenEffects xmlns="" xmlns:a14="http://schemas.microsoft.com/office/drawing/2010/main">
                 <a:effectLst>
                   <a:outerShdw dist="35921" dir="2700000" algn="ctr" rotWithShape="0">
                     <a:schemeClr val="bg2"/>
@@ -8403,7 +8382,7 @@
     </p:spTree>
     <p:extLst>
       <p:ext uri="{BB962C8B-B14F-4D97-AF65-F5344CB8AC3E}">
-        <p14:creationId xmlns:p14="http://schemas.microsoft.com/office/powerpoint/2010/main" xmlns="" val="1172241827"/>
+        <p14:creationId xmlns="" xmlns:p14="http://schemas.microsoft.com/office/powerpoint/2010/main" val="1172241827"/>
       </p:ext>
     </p:extLst>
   </p:cSld>
@@ -8594,7 +8573,7 @@
     </p:spTree>
     <p:extLst>
       <p:ext uri="{BB962C8B-B14F-4D97-AF65-F5344CB8AC3E}">
-        <p14:creationId xmlns:p14="http://schemas.microsoft.com/office/powerpoint/2010/main" xmlns="" val="88608496"/>
+        <p14:creationId xmlns="" xmlns:p14="http://schemas.microsoft.com/office/powerpoint/2010/main" val="88608496"/>
       </p:ext>
     </p:extLst>
   </p:cSld>
@@ -8805,7 +8784,7 @@
     </p:spTree>
     <p:extLst>
       <p:ext uri="{BB962C8B-B14F-4D97-AF65-F5344CB8AC3E}">
-        <p14:creationId xmlns:p14="http://schemas.microsoft.com/office/powerpoint/2010/main" xmlns="" val="3934171707"/>
+        <p14:creationId xmlns="" xmlns:p14="http://schemas.microsoft.com/office/powerpoint/2010/main" val="3934171707"/>
       </p:ext>
     </p:extLst>
   </p:cSld>
@@ -9025,7 +9004,7 @@
           <a:blip r:embed="rId3" cstate="print">
             <a:extLst>
               <a:ext uri="{28A0092B-C50C-407E-A947-70E740481C1C}">
-                <a14:useLocalDpi xmlns:a14="http://schemas.microsoft.com/office/drawing/2010/main" xmlns="" val="0"/>
+                <a14:useLocalDpi xmlns="" xmlns:a14="http://schemas.microsoft.com/office/drawing/2010/main" val="0"/>
               </a:ext>
             </a:extLst>
           </a:blip>
@@ -9049,14 +9028,14 @@
           <a:effectLst/>
           <a:extLst>
             <a:ext uri="{909E8E84-426E-40DD-AFC4-6F175D3DCCD1}">
-              <a14:hiddenFill xmlns:a14="http://schemas.microsoft.com/office/drawing/2010/main" xmlns="">
+              <a14:hiddenFill xmlns="" xmlns:a14="http://schemas.microsoft.com/office/drawing/2010/main">
                 <a:solidFill>
                   <a:schemeClr val="accent1"/>
                 </a:solidFill>
               </a14:hiddenFill>
             </a:ext>
             <a:ext uri="{91240B29-F687-4F45-9708-019B960494DF}">
-              <a14:hiddenLine xmlns:a14="http://schemas.microsoft.com/office/drawing/2010/main" xmlns="" w="9525">
+              <a14:hiddenLine xmlns="" xmlns:a14="http://schemas.microsoft.com/office/drawing/2010/main" w="9525">
                 <a:solidFill>
                   <a:schemeClr val="tx1"/>
                 </a:solidFill>
@@ -9066,7 +9045,7 @@
               </a14:hiddenLine>
             </a:ext>
             <a:ext uri="{AF507438-7753-43E0-B8FC-AC1667EBCBE1}">
-              <a14:hiddenEffects xmlns:a14="http://schemas.microsoft.com/office/drawing/2010/main" xmlns="">
+              <a14:hiddenEffects xmlns="" xmlns:a14="http://schemas.microsoft.com/office/drawing/2010/main">
                 <a:effectLst>
                   <a:outerShdw dist="35921" dir="2700000" algn="ctr" rotWithShape="0">
                     <a:schemeClr val="bg2"/>
@@ -9080,7 +9059,7 @@
     </p:spTree>
     <p:extLst>
       <p:ext uri="{BB962C8B-B14F-4D97-AF65-F5344CB8AC3E}">
-        <p14:creationId xmlns:p14="http://schemas.microsoft.com/office/powerpoint/2010/main" xmlns="" val="2161871131"/>
+        <p14:creationId xmlns="" xmlns:p14="http://schemas.microsoft.com/office/powerpoint/2010/main" val="2161871131"/>
       </p:ext>
     </p:extLst>
   </p:cSld>
@@ -9263,7 +9242,7 @@
     </p:spTree>
     <p:extLst>
       <p:ext uri="{BB962C8B-B14F-4D97-AF65-F5344CB8AC3E}">
-        <p14:creationId xmlns:p14="http://schemas.microsoft.com/office/powerpoint/2010/main" xmlns="" val="258686234"/>
+        <p14:creationId xmlns="" xmlns:p14="http://schemas.microsoft.com/office/powerpoint/2010/main" val="258686234"/>
       </p:ext>
     </p:extLst>
   </p:cSld>
@@ -9452,7 +9431,7 @@
           <a:blip r:embed="rId3" cstate="print">
             <a:extLst>
               <a:ext uri="{28A0092B-C50C-407E-A947-70E740481C1C}">
-                <a14:useLocalDpi xmlns:a14="http://schemas.microsoft.com/office/drawing/2010/main" xmlns="" val="0"/>
+                <a14:useLocalDpi xmlns="" xmlns:a14="http://schemas.microsoft.com/office/drawing/2010/main" val="0"/>
               </a:ext>
             </a:extLst>
           </a:blip>
@@ -9476,14 +9455,14 @@
           <a:effectLst/>
           <a:extLst>
             <a:ext uri="{909E8E84-426E-40DD-AFC4-6F175D3DCCD1}">
-              <a14:hiddenFill xmlns:a14="http://schemas.microsoft.com/office/drawing/2010/main" xmlns="">
+              <a14:hiddenFill xmlns="" xmlns:a14="http://schemas.microsoft.com/office/drawing/2010/main">
                 <a:solidFill>
                   <a:schemeClr val="accent1"/>
                 </a:solidFill>
               </a14:hiddenFill>
             </a:ext>
             <a:ext uri="{91240B29-F687-4F45-9708-019B960494DF}">
-              <a14:hiddenLine xmlns:a14="http://schemas.microsoft.com/office/drawing/2010/main" xmlns="" w="9525">
+              <a14:hiddenLine xmlns="" xmlns:a14="http://schemas.microsoft.com/office/drawing/2010/main" w="9525">
                 <a:solidFill>
                   <a:schemeClr val="tx1"/>
                 </a:solidFill>
@@ -9493,7 +9472,7 @@
               </a14:hiddenLine>
             </a:ext>
             <a:ext uri="{AF507438-7753-43E0-B8FC-AC1667EBCBE1}">
-              <a14:hiddenEffects xmlns:a14="http://schemas.microsoft.com/office/drawing/2010/main" xmlns="">
+              <a14:hiddenEffects xmlns="" xmlns:a14="http://schemas.microsoft.com/office/drawing/2010/main">
                 <a:effectLst>
                   <a:outerShdw dist="35921" dir="2700000" algn="ctr" rotWithShape="0">
                     <a:schemeClr val="bg2"/>
@@ -9507,7 +9486,7 @@
     </p:spTree>
     <p:extLst>
       <p:ext uri="{BB962C8B-B14F-4D97-AF65-F5344CB8AC3E}">
-        <p14:creationId xmlns:p14="http://schemas.microsoft.com/office/powerpoint/2010/main" xmlns="" val="1549667041"/>
+        <p14:creationId xmlns="" xmlns:p14="http://schemas.microsoft.com/office/powerpoint/2010/main" val="1549667041"/>
       </p:ext>
     </p:extLst>
   </p:cSld>
@@ -9696,7 +9675,7 @@
     </p:spTree>
     <p:extLst>
       <p:ext uri="{BB962C8B-B14F-4D97-AF65-F5344CB8AC3E}">
-        <p14:creationId xmlns:p14="http://schemas.microsoft.com/office/powerpoint/2010/main" xmlns="" val="1193325034"/>
+        <p14:creationId xmlns="" xmlns:p14="http://schemas.microsoft.com/office/powerpoint/2010/main" val="1193325034"/>
       </p:ext>
     </p:extLst>
   </p:cSld>
@@ -9898,7 +9877,7 @@
     </p:spTree>
     <p:extLst>
       <p:ext uri="{BB962C8B-B14F-4D97-AF65-F5344CB8AC3E}">
-        <p14:creationId xmlns:p14="http://schemas.microsoft.com/office/powerpoint/2010/main" xmlns="" val="3495113006"/>
+        <p14:creationId xmlns="" xmlns:p14="http://schemas.microsoft.com/office/powerpoint/2010/main" val="3495113006"/>
       </p:ext>
     </p:extLst>
   </p:cSld>
@@ -10081,7 +10060,7 @@
     </p:spTree>
     <p:extLst>
       <p:ext uri="{BB962C8B-B14F-4D97-AF65-F5344CB8AC3E}">
-        <p14:creationId xmlns:p14="http://schemas.microsoft.com/office/powerpoint/2010/main" xmlns="" val="1193325034"/>
+        <p14:creationId xmlns="" xmlns:p14="http://schemas.microsoft.com/office/powerpoint/2010/main" val="1193325034"/>
       </p:ext>
     </p:extLst>
   </p:cSld>
@@ -10268,8 +10247,42 @@
                 <a:ea typeface="ＭＳ Ｐゴシック" pitchFamily="34" charset="-128"/>
                 <a:cs typeface="Verdana"/>
               </a:rPr>
-              <a:t>Simulation results</a:t>
-            </a:r>
+              <a:t>Simulation </a:t>
+            </a:r>
+            <a:r>
+              <a:rPr lang="en-US" sz="2400" kern="0" dirty="0" smtClean="0">
+                <a:latin typeface="Verdana"/>
+                <a:ea typeface="ＭＳ Ｐゴシック" pitchFamily="34" charset="-128"/>
+                <a:cs typeface="Verdana"/>
+              </a:rPr>
+              <a:t>results</a:t>
+            </a:r>
+          </a:p>
+          <a:p>
+            <a:pPr fontAlgn="base">
+              <a:spcBef>
+                <a:spcPct val="75000"/>
+              </a:spcBef>
+              <a:spcAft>
+                <a:spcPct val="0"/>
+              </a:spcAft>
+              <a:buFont typeface="Arial" pitchFamily="34" charset="0"/>
+              <a:buChar char="•"/>
+              <a:defRPr/>
+            </a:pPr>
+            <a:r>
+              <a:rPr lang="en-US" sz="2400" kern="0" dirty="0" smtClean="0">
+                <a:latin typeface="Verdana"/>
+                <a:ea typeface="ＭＳ Ｐゴシック" pitchFamily="34" charset="-128"/>
+                <a:cs typeface="Verdana"/>
+              </a:rPr>
+              <a:t>Related work</a:t>
+            </a:r>
+            <a:endParaRPr lang="en-US" sz="2400" kern="0" dirty="0" smtClean="0">
+              <a:latin typeface="Verdana"/>
+              <a:ea typeface="ＭＳ Ｐゴシック" pitchFamily="34" charset="-128"/>
+              <a:cs typeface="Verdana"/>
+            </a:endParaRPr>
           </a:p>
           <a:p>
             <a:pPr fontAlgn="base">
@@ -10411,7 +10424,7 @@
     </p:spTree>
     <p:extLst>
       <p:ext uri="{BB962C8B-B14F-4D97-AF65-F5344CB8AC3E}">
-        <p14:creationId xmlns:p14="http://schemas.microsoft.com/office/powerpoint/2010/main" xmlns="" val="1352295260"/>
+        <p14:creationId xmlns="" xmlns:p14="http://schemas.microsoft.com/office/powerpoint/2010/main" val="1352295260"/>
       </p:ext>
     </p:extLst>
   </p:cSld>
@@ -10597,7 +10610,7 @@
           <a:blip r:embed="rId3" cstate="print">
             <a:extLst>
               <a:ext uri="{28A0092B-C50C-407E-A947-70E740481C1C}">
-                <a14:useLocalDpi xmlns:a14="http://schemas.microsoft.com/office/drawing/2010/main" xmlns="" val="0"/>
+                <a14:useLocalDpi xmlns="" xmlns:a14="http://schemas.microsoft.com/office/drawing/2010/main" val="0"/>
               </a:ext>
             </a:extLst>
           </a:blip>
@@ -10621,14 +10634,14 @@
           <a:effectLst/>
           <a:extLst>
             <a:ext uri="{909E8E84-426E-40DD-AFC4-6F175D3DCCD1}">
-              <a14:hiddenFill xmlns:a14="http://schemas.microsoft.com/office/drawing/2010/main" xmlns="">
+              <a14:hiddenFill xmlns="" xmlns:a14="http://schemas.microsoft.com/office/drawing/2010/main">
                 <a:solidFill>
                   <a:schemeClr val="accent1"/>
                 </a:solidFill>
               </a14:hiddenFill>
             </a:ext>
             <a:ext uri="{91240B29-F687-4F45-9708-019B960494DF}">
-              <a14:hiddenLine xmlns:a14="http://schemas.microsoft.com/office/drawing/2010/main" xmlns="" w="9525">
+              <a14:hiddenLine xmlns="" xmlns:a14="http://schemas.microsoft.com/office/drawing/2010/main" w="9525">
                 <a:solidFill>
                   <a:schemeClr val="tx1"/>
                 </a:solidFill>
@@ -10638,7 +10651,7 @@
               </a14:hiddenLine>
             </a:ext>
             <a:ext uri="{AF507438-7753-43E0-B8FC-AC1667EBCBE1}">
-              <a14:hiddenEffects xmlns:a14="http://schemas.microsoft.com/office/drawing/2010/main" xmlns="">
+              <a14:hiddenEffects xmlns="" xmlns:a14="http://schemas.microsoft.com/office/drawing/2010/main">
                 <a:effectLst>
                   <a:outerShdw dist="35921" dir="2700000" algn="ctr" rotWithShape="0">
                     <a:schemeClr val="bg2"/>
@@ -10652,7 +10665,7 @@
     </p:spTree>
     <p:extLst>
       <p:ext uri="{BB962C8B-B14F-4D97-AF65-F5344CB8AC3E}">
-        <p14:creationId xmlns:p14="http://schemas.microsoft.com/office/powerpoint/2010/main" xmlns="" val="1990835183"/>
+        <p14:creationId xmlns="" xmlns:p14="http://schemas.microsoft.com/office/powerpoint/2010/main" val="1990835183"/>
       </p:ext>
     </p:extLst>
   </p:cSld>
@@ -10835,7 +10848,7 @@
     </p:spTree>
     <p:extLst>
       <p:ext uri="{BB962C8B-B14F-4D97-AF65-F5344CB8AC3E}">
-        <p14:creationId xmlns:p14="http://schemas.microsoft.com/office/powerpoint/2010/main" xmlns="" val="537376198"/>
+        <p14:creationId xmlns="" xmlns:p14="http://schemas.microsoft.com/office/powerpoint/2010/main" val="537376198"/>
       </p:ext>
     </p:extLst>
   </p:cSld>
@@ -11272,7 +11285,7 @@
     </p:spTree>
     <p:extLst>
       <p:ext uri="{BB962C8B-B14F-4D97-AF65-F5344CB8AC3E}">
-        <p14:creationId xmlns:p14="http://schemas.microsoft.com/office/powerpoint/2010/main" xmlns="" val="2627711932"/>
+        <p14:creationId xmlns="" xmlns:p14="http://schemas.microsoft.com/office/powerpoint/2010/main" val="2627711932"/>
       </p:ext>
     </p:extLst>
   </p:cSld>
@@ -11388,8 +11401,21 @@
                 <a:ea typeface="ＭＳ Ｐゴシック" pitchFamily="34" charset="-128"/>
                 <a:cs typeface="Verdana"/>
               </a:rPr>
-              <a:t>Java based event-driven simulator that we developed</a:t>
-            </a:r>
+              <a:t>Java based event-driven simulator that </a:t>
+            </a:r>
+            <a:r>
+              <a:rPr lang="en-US" sz="2400" kern="0" noProof="0" dirty="0" smtClean="0">
+                <a:latin typeface="Verdana"/>
+                <a:ea typeface="ＭＳ Ｐゴシック" pitchFamily="34" charset="-128"/>
+                <a:cs typeface="Verdana"/>
+              </a:rPr>
+              <a:t>was developed for the simulations</a:t>
+            </a:r>
+            <a:endParaRPr lang="en-US" sz="2400" kern="0" noProof="0" dirty="0" smtClean="0">
+              <a:latin typeface="Verdana"/>
+              <a:ea typeface="ＭＳ Ｐゴシック" pitchFamily="34" charset="-128"/>
+              <a:cs typeface="Verdana"/>
+            </a:endParaRPr>
           </a:p>
           <a:p>
             <a:pPr lvl="1" fontAlgn="base">
@@ -11536,7 +11562,7 @@
     </p:spTree>
     <p:extLst>
       <p:ext uri="{BB962C8B-B14F-4D97-AF65-F5344CB8AC3E}">
-        <p14:creationId xmlns:p14="http://schemas.microsoft.com/office/powerpoint/2010/main" xmlns="" val="537376198"/>
+        <p14:creationId xmlns="" xmlns:p14="http://schemas.microsoft.com/office/powerpoint/2010/main" val="537376198"/>
       </p:ext>
     </p:extLst>
   </p:cSld>
@@ -11669,7 +11695,7 @@
           <a:blip r:embed="rId3" cstate="print">
             <a:extLst>
               <a:ext uri="{28A0092B-C50C-407E-A947-70E740481C1C}">
-                <a14:useLocalDpi xmlns:a14="http://schemas.microsoft.com/office/drawing/2010/main" xmlns="" val="0"/>
+                <a14:useLocalDpi xmlns="" xmlns:a14="http://schemas.microsoft.com/office/drawing/2010/main" val="0"/>
               </a:ext>
             </a:extLst>
           </a:blip>
@@ -11693,14 +11719,14 @@
           <a:effectLst/>
           <a:extLst>
             <a:ext uri="{909E8E84-426E-40DD-AFC4-6F175D3DCCD1}">
-              <a14:hiddenFill xmlns:a14="http://schemas.microsoft.com/office/drawing/2010/main" xmlns="">
+              <a14:hiddenFill xmlns="" xmlns:a14="http://schemas.microsoft.com/office/drawing/2010/main">
                 <a:solidFill>
                   <a:schemeClr val="accent1"/>
                 </a:solidFill>
               </a14:hiddenFill>
             </a:ext>
             <a:ext uri="{91240B29-F687-4F45-9708-019B960494DF}">
-              <a14:hiddenLine xmlns:a14="http://schemas.microsoft.com/office/drawing/2010/main" xmlns="" w="9525">
+              <a14:hiddenLine xmlns="" xmlns:a14="http://schemas.microsoft.com/office/drawing/2010/main" w="9525">
                 <a:solidFill>
                   <a:schemeClr val="tx1"/>
                 </a:solidFill>
@@ -11710,7 +11736,7 @@
               </a14:hiddenLine>
             </a:ext>
             <a:ext uri="{AF507438-7753-43E0-B8FC-AC1667EBCBE1}">
-              <a14:hiddenEffects xmlns:a14="http://schemas.microsoft.com/office/drawing/2010/main" xmlns="">
+              <a14:hiddenEffects xmlns="" xmlns:a14="http://schemas.microsoft.com/office/drawing/2010/main">
                 <a:effectLst>
                   <a:outerShdw dist="35921" dir="2700000" algn="ctr" rotWithShape="0">
                     <a:schemeClr val="bg2"/>
@@ -11724,7 +11750,7 @@
     </p:spTree>
     <p:extLst>
       <p:ext uri="{BB962C8B-B14F-4D97-AF65-F5344CB8AC3E}">
-        <p14:creationId xmlns:p14="http://schemas.microsoft.com/office/powerpoint/2010/main" xmlns="" val="496337132"/>
+        <p14:creationId xmlns="" xmlns:p14="http://schemas.microsoft.com/office/powerpoint/2010/main" val="496337132"/>
       </p:ext>
     </p:extLst>
   </p:cSld>
@@ -11857,7 +11883,7 @@
           <a:blip r:embed="rId3" cstate="print">
             <a:extLst>
               <a:ext uri="{28A0092B-C50C-407E-A947-70E740481C1C}">
-                <a14:useLocalDpi xmlns:a14="http://schemas.microsoft.com/office/drawing/2010/main" xmlns="" val="0"/>
+                <a14:useLocalDpi xmlns="" xmlns:a14="http://schemas.microsoft.com/office/drawing/2010/main" val="0"/>
               </a:ext>
             </a:extLst>
           </a:blip>
@@ -11881,14 +11907,14 @@
           <a:effectLst/>
           <a:extLst>
             <a:ext uri="{909E8E84-426E-40DD-AFC4-6F175D3DCCD1}">
-              <a14:hiddenFill xmlns:a14="http://schemas.microsoft.com/office/drawing/2010/main" xmlns="">
+              <a14:hiddenFill xmlns="" xmlns:a14="http://schemas.microsoft.com/office/drawing/2010/main">
                 <a:solidFill>
                   <a:schemeClr val="accent1"/>
                 </a:solidFill>
               </a14:hiddenFill>
             </a:ext>
             <a:ext uri="{91240B29-F687-4F45-9708-019B960494DF}">
-              <a14:hiddenLine xmlns:a14="http://schemas.microsoft.com/office/drawing/2010/main" xmlns="" w="9525">
+              <a14:hiddenLine xmlns="" xmlns:a14="http://schemas.microsoft.com/office/drawing/2010/main" w="9525">
                 <a:solidFill>
                   <a:schemeClr val="tx1"/>
                 </a:solidFill>
@@ -11898,7 +11924,7 @@
               </a14:hiddenLine>
             </a:ext>
             <a:ext uri="{AF507438-7753-43E0-B8FC-AC1667EBCBE1}">
-              <a14:hiddenEffects xmlns:a14="http://schemas.microsoft.com/office/drawing/2010/main" xmlns="">
+              <a14:hiddenEffects xmlns="" xmlns:a14="http://schemas.microsoft.com/office/drawing/2010/main">
                 <a:effectLst>
                   <a:outerShdw dist="35921" dir="2700000" algn="ctr" rotWithShape="0">
                     <a:schemeClr val="bg2"/>
@@ -11912,7 +11938,7 @@
     </p:spTree>
     <p:extLst>
       <p:ext uri="{BB962C8B-B14F-4D97-AF65-F5344CB8AC3E}">
-        <p14:creationId xmlns:p14="http://schemas.microsoft.com/office/powerpoint/2010/main" xmlns="" val="300159156"/>
+        <p14:creationId xmlns="" xmlns:p14="http://schemas.microsoft.com/office/powerpoint/2010/main" val="300159156"/>
       </p:ext>
     </p:extLst>
   </p:cSld>
@@ -11949,6 +11975,217 @@
       </p:grpSpPr>
       <p:sp>
         <p:nvSpPr>
+          <p:cNvPr id="2" name="Title 1"/>
+          <p:cNvSpPr>
+            <a:spLocks noGrp="1"/>
+          </p:cNvSpPr>
+          <p:nvPr>
+            <p:ph type="title"/>
+          </p:nvPr>
+        </p:nvSpPr>
+        <p:spPr/>
+        <p:txBody>
+          <a:bodyPr/>
+          <a:lstStyle/>
+          <a:p>
+            <a:r>
+              <a:rPr lang="en-US" dirty="0" smtClean="0"/>
+              <a:t>Related work</a:t>
+            </a:r>
+            <a:endParaRPr lang="en-US" dirty="0"/>
+          </a:p>
+        </p:txBody>
+      </p:sp>
+      <p:sp>
+        <p:nvSpPr>
+          <p:cNvPr id="3" name="Content Placeholder 2"/>
+          <p:cNvSpPr>
+            <a:spLocks noGrp="1"/>
+          </p:cNvSpPr>
+          <p:nvPr>
+            <p:ph sz="quarter" idx="1"/>
+          </p:nvPr>
+        </p:nvSpPr>
+        <p:spPr/>
+        <p:txBody>
+          <a:bodyPr>
+            <a:normAutofit/>
+          </a:bodyPr>
+          <a:lstStyle/>
+          <a:p>
+            <a:r>
+              <a:rPr lang="en-US" dirty="0" smtClean="0"/>
+              <a:t>Vector bin-packing problem: </a:t>
+            </a:r>
+            <a:r>
+              <a:rPr lang="en-US" dirty="0" smtClean="0"/>
+              <a:t>allocating virtual machines to physical </a:t>
+            </a:r>
+            <a:r>
+              <a:rPr lang="en-US" dirty="0" smtClean="0"/>
+              <a:t>servers (</a:t>
+            </a:r>
+            <a:r>
+              <a:rPr lang="en-US" dirty="0" smtClean="0"/>
+              <a:t>virtual machine placement </a:t>
+            </a:r>
+            <a:r>
+              <a:rPr lang="en-US" dirty="0" smtClean="0"/>
+              <a:t>problem) </a:t>
+            </a:r>
+            <a:r>
+              <a:rPr lang="en-US" dirty="0" err="1" smtClean="0"/>
+              <a:t>Rina</a:t>
+            </a:r>
+            <a:r>
+              <a:rPr lang="en-US" dirty="0" smtClean="0"/>
+              <a:t> </a:t>
+            </a:r>
+            <a:r>
+              <a:rPr lang="en-US" dirty="0" err="1" smtClean="0"/>
+              <a:t>Panigrahy</a:t>
+            </a:r>
+            <a:r>
+              <a:rPr lang="en-US" dirty="0" smtClean="0"/>
+              <a:t> et al. Heuristics for </a:t>
+            </a:r>
+            <a:r>
+              <a:rPr lang="en-US" dirty="0" smtClean="0"/>
+              <a:t>vector bin packing</a:t>
+            </a:r>
+            <a:endParaRPr lang="en-US" dirty="0" smtClean="0"/>
+          </a:p>
+          <a:p>
+            <a:r>
+              <a:rPr lang="en-US" dirty="0" smtClean="0"/>
+              <a:t>Meta-schedulers: </a:t>
+            </a:r>
+            <a:r>
+              <a:rPr lang="en-US" dirty="0" smtClean="0"/>
+              <a:t>David </a:t>
+            </a:r>
+            <a:r>
+              <a:rPr lang="en-US" dirty="0" err="1" smtClean="0"/>
+              <a:t>Talby</a:t>
+            </a:r>
+            <a:r>
+              <a:rPr lang="en-US" dirty="0" smtClean="0"/>
+              <a:t> and Dror G. Feitelson. Improving and stabilizing parallel </a:t>
+            </a:r>
+            <a:r>
+              <a:rPr lang="en-US" dirty="0" smtClean="0"/>
+              <a:t>computer performance </a:t>
+            </a:r>
+            <a:r>
+              <a:rPr lang="en-US" dirty="0" smtClean="0"/>
+              <a:t>using adaptive </a:t>
+            </a:r>
+            <a:r>
+              <a:rPr lang="en-US" dirty="0" smtClean="0"/>
+              <a:t>backfilling</a:t>
+            </a:r>
+          </a:p>
+          <a:p>
+            <a:r>
+              <a:rPr lang="en-US" dirty="0" smtClean="0"/>
+              <a:t>Other approaches:</a:t>
+            </a:r>
+          </a:p>
+          <a:p>
+            <a:pPr lvl="1"/>
+            <a:r>
+              <a:rPr lang="en-US" dirty="0" smtClean="0"/>
+              <a:t>Reservations with on-line </a:t>
+            </a:r>
+            <a:r>
+              <a:rPr lang="en-US" dirty="0" smtClean="0"/>
+              <a:t>backfilling (</a:t>
+            </a:r>
+            <a:r>
+              <a:rPr lang="en-US" dirty="0" err="1" smtClean="0"/>
+              <a:t>Srinivasan</a:t>
+            </a:r>
+            <a:r>
+              <a:rPr lang="en-US" dirty="0" smtClean="0"/>
+              <a:t> et </a:t>
+            </a:r>
+            <a:r>
+              <a:rPr lang="en-US" dirty="0" smtClean="0"/>
+              <a:t>al</a:t>
+            </a:r>
+            <a:r>
+              <a:rPr lang="en-US" dirty="0" smtClean="0"/>
+              <a:t>.)</a:t>
+            </a:r>
+          </a:p>
+          <a:p>
+            <a:pPr lvl="1"/>
+            <a:r>
+              <a:rPr lang="en-US" dirty="0" smtClean="0"/>
+              <a:t>Altering </a:t>
+            </a:r>
+            <a:r>
+              <a:rPr lang="en-US" dirty="0" smtClean="0"/>
+              <a:t>resources requirements of job submission. </a:t>
+            </a:r>
+            <a:r>
+              <a:rPr lang="en-US" dirty="0" smtClean="0"/>
+              <a:t>(Yom-</a:t>
+            </a:r>
+            <a:r>
+              <a:rPr lang="en-US" dirty="0" err="1" smtClean="0"/>
+              <a:t>Tov</a:t>
+            </a:r>
+            <a:r>
+              <a:rPr lang="en-US" dirty="0" smtClean="0"/>
+              <a:t> </a:t>
+            </a:r>
+            <a:r>
+              <a:rPr lang="en-US" dirty="0" smtClean="0"/>
+              <a:t>And </a:t>
+            </a:r>
+            <a:r>
+              <a:rPr lang="en-US" dirty="0" err="1" smtClean="0"/>
+              <a:t>Aridor</a:t>
+            </a:r>
+            <a:r>
+              <a:rPr lang="en-US" smtClean="0"/>
+              <a:t>) </a:t>
+            </a:r>
+            <a:endParaRPr lang="en-US" dirty="0" smtClean="0"/>
+          </a:p>
+          <a:p>
+            <a:endParaRPr lang="en-US" dirty="0"/>
+          </a:p>
+        </p:txBody>
+      </p:sp>
+    </p:spTree>
+  </p:cSld>
+  <p:clrMapOvr>
+    <a:masterClrMapping/>
+  </p:clrMapOvr>
+</p:sld>
+</file>
+
+<file path=ppt/slides/slide28.xml><?xml version="1.0" encoding="utf-8"?>
+<p:sld xmlns:a="http://schemas.openxmlformats.org/drawingml/2006/main" xmlns:r="http://schemas.openxmlformats.org/officeDocument/2006/relationships" xmlns:p="http://schemas.openxmlformats.org/presentationml/2006/main">
+  <p:cSld>
+    <p:spTree>
+      <p:nvGrpSpPr>
+        <p:cNvPr id="1" name=""/>
+        <p:cNvGrpSpPr/>
+        <p:nvPr/>
+      </p:nvGrpSpPr>
+      <p:grpSpPr>
+        <a:xfrm>
+          <a:off x="0" y="0"/>
+          <a:ext cx="0" cy="0"/>
+          <a:chOff x="0" y="0"/>
+          <a:chExt cx="0" cy="0"/>
+        </a:xfrm>
+      </p:grpSpPr>
+      <p:sp>
+        <p:nvSpPr>
           <p:cNvPr id="4" name="Title 3"/>
           <p:cNvSpPr>
             <a:spLocks noGrp="1"/>
@@ -12014,7 +12251,15 @@
             </a:pPr>
             <a:r>
               <a:rPr lang="en-US" sz="2400" dirty="0" smtClean="0"/>
-              <a:t>In this paper we investigated the problem of resource matching in Intel’s compute farm</a:t>
+              <a:t>In this </a:t>
+            </a:r>
+            <a:r>
+              <a:rPr lang="en-US" sz="2400" dirty="0" smtClean="0"/>
+              <a:t>work we </a:t>
+            </a:r>
+            <a:r>
+              <a:rPr lang="en-US" sz="2400" dirty="0" smtClean="0"/>
+              <a:t>investigated the problem of resource matching in Intel’s compute farm</a:t>
             </a:r>
           </a:p>
           <a:p>
@@ -12150,7 +12395,14 @@
                 <a:ea typeface="ＭＳ Ｐゴシック" pitchFamily="34" charset="-128"/>
                 <a:cs typeface="Verdana"/>
               </a:rPr>
-              <a:t>Open source simulator:</a:t>
+              <a:t>Open source </a:t>
+            </a:r>
+            <a:r>
+              <a:rPr lang="en-US" sz="2200" kern="0" dirty="0" smtClean="0">
+                <a:ea typeface="ＭＳ Ｐゴシック" pitchFamily="34" charset="-128"/>
+                <a:cs typeface="Verdana"/>
+              </a:rPr>
+              <a:t>simulator</a:t>
             </a:r>
           </a:p>
           <a:p>
@@ -12161,31 +12413,17 @@
               <a:spcAft>
                 <a:spcPct val="0"/>
               </a:spcAft>
+              <a:buFont typeface="Arial" pitchFamily="34" charset="0"/>
+              <a:buChar char="•"/>
               <a:defRPr/>
             </a:pPr>
             <a:r>
-              <a:rPr lang="en-US" sz="2200" kern="0" dirty="0">
+              <a:rPr lang="en-US" sz="2200" kern="0" dirty="0" smtClean="0">
                 <a:ea typeface="ＭＳ Ｐゴシック" pitchFamily="34" charset="-128"/>
                 <a:cs typeface="Verdana"/>
               </a:rPr>
-              <a:t> </a:t>
-            </a:r>
-            <a:r>
-              <a:rPr lang="en-US" sz="2400" dirty="0">
-                <a:hlinkClick r:id="rId2"/>
-              </a:rPr>
-              <a:t>https://code.google.com/p/batch-simulator/</a:t>
-            </a:r>
-            <a:endParaRPr lang="en-US" sz="2400" dirty="0"/>
-          </a:p>
-          <a:p>
-            <a:pPr lvl="1">
-              <a:lnSpc>
-                <a:spcPct val="150000"/>
-              </a:lnSpc>
-              <a:buFont typeface="Arial" pitchFamily="34" charset="0"/>
-              <a:buChar char="•"/>
-            </a:pPr>
+              <a:t>Paper was presented at JSSPP 2013</a:t>
+            </a:r>
             <a:endParaRPr lang="en-US" sz="2400" kern="0" dirty="0" smtClean="0">
               <a:ea typeface="ＭＳ Ｐゴシック" pitchFamily="34" charset="-128"/>
               <a:cs typeface="Verdana"/>
@@ -12196,7 +12434,7 @@
     </p:spTree>
     <p:extLst>
       <p:ext uri="{BB962C8B-B14F-4D97-AF65-F5344CB8AC3E}">
-        <p14:creationId xmlns:p14="http://schemas.microsoft.com/office/powerpoint/2010/main" xmlns="" val="4048624234"/>
+        <p14:creationId xmlns="" xmlns:p14="http://schemas.microsoft.com/office/powerpoint/2010/main" val="4048624234"/>
       </p:ext>
     </p:extLst>
   </p:cSld>
@@ -12214,7 +12452,7 @@
 </p:sld>
 </file>
 
-<file path=ppt/slides/slide28.xml><?xml version="1.0" encoding="utf-8"?>
+<file path=ppt/slides/slide29.xml><?xml version="1.0" encoding="utf-8"?>
 <p:sld xmlns:a="http://schemas.openxmlformats.org/drawingml/2006/main" xmlns:r="http://schemas.openxmlformats.org/officeDocument/2006/relationships" xmlns:p="http://schemas.openxmlformats.org/presentationml/2006/main">
   <p:cSld>
     <p:spTree>
@@ -12343,60 +12581,15 @@
                   </a:outerShdw>
                 </a:effectLst>
               </a:rPr>
-              <a:t>Thank </a:t>
-            </a:r>
-            <a:r>
-              <a:rPr lang="en-US" sz="5400" b="1" dirty="0" smtClean="0">
-                <a:ln w="19050">
-                  <a:solidFill>
-                    <a:schemeClr val="tx2">
-                      <a:tint val="1000"/>
-                    </a:schemeClr>
-                  </a:solidFill>
-                  <a:prstDash val="solid"/>
-                </a:ln>
-                <a:solidFill>
-                  <a:schemeClr val="accent3"/>
-                </a:solidFill>
-                <a:effectLst>
-                  <a:outerShdw blurRad="50000" dist="50800" dir="7500000" algn="tl">
-                    <a:srgbClr val="000000">
-                      <a:shade val="5000"/>
-                      <a:alpha val="35000"/>
-                    </a:srgbClr>
-                  </a:outerShdw>
-                </a:effectLst>
-              </a:rPr>
-              <a:t>you! </a:t>
-            </a:r>
-            <a:endParaRPr lang="en-US" sz="5400" b="1" dirty="0" smtClean="0">
-              <a:ln w="19050">
-                <a:solidFill>
-                  <a:schemeClr val="tx2">
-                    <a:tint val="1000"/>
-                  </a:schemeClr>
-                </a:solidFill>
-                <a:prstDash val="solid"/>
-              </a:ln>
-              <a:solidFill>
-                <a:schemeClr val="accent3"/>
-              </a:solidFill>
-              <a:effectLst>
-                <a:outerShdw blurRad="50000" dist="50800" dir="7500000" algn="tl">
-                  <a:srgbClr val="000000">
-                    <a:shade val="5000"/>
-                    <a:alpha val="35000"/>
-                  </a:srgbClr>
-                </a:outerShdw>
-              </a:effectLst>
-            </a:endParaRPr>
+              <a:t>Thank you! </a:t>
+            </a:r>
           </a:p>
         </p:txBody>
       </p:sp>
     </p:spTree>
     <p:extLst>
       <p:ext uri="{BB962C8B-B14F-4D97-AF65-F5344CB8AC3E}">
-        <p14:creationId xmlns:p14="http://schemas.microsoft.com/office/powerpoint/2010/main" xmlns="" val="4048624234"/>
+        <p14:creationId xmlns="" xmlns:p14="http://schemas.microsoft.com/office/powerpoint/2010/main" val="4048624234"/>
       </p:ext>
     </p:extLst>
   </p:cSld>
@@ -12656,7 +12849,7 @@
     </p:spTree>
     <p:extLst>
       <p:ext uri="{BB962C8B-B14F-4D97-AF65-F5344CB8AC3E}">
-        <p14:creationId xmlns:p14="http://schemas.microsoft.com/office/powerpoint/2010/main" xmlns="" val="3227401764"/>
+        <p14:creationId xmlns="" xmlns:p14="http://schemas.microsoft.com/office/powerpoint/2010/main" val="3227401764"/>
       </p:ext>
     </p:extLst>
   </p:cSld>
@@ -13303,7 +13496,7 @@
     </p:spTree>
     <p:extLst>
       <p:ext uri="{BB962C8B-B14F-4D97-AF65-F5344CB8AC3E}">
-        <p14:creationId xmlns:p14="http://schemas.microsoft.com/office/powerpoint/2010/main" xmlns="" val="3841741436"/>
+        <p14:creationId xmlns="" xmlns:p14="http://schemas.microsoft.com/office/powerpoint/2010/main" val="3841741436"/>
       </p:ext>
     </p:extLst>
   </p:cSld>
@@ -13950,7 +14143,7 @@
     </p:spTree>
     <p:extLst>
       <p:ext uri="{BB962C8B-B14F-4D97-AF65-F5344CB8AC3E}">
-        <p14:creationId xmlns:p14="http://schemas.microsoft.com/office/powerpoint/2010/main" xmlns="" val="1337277195"/>
+        <p14:creationId xmlns="" xmlns:p14="http://schemas.microsoft.com/office/powerpoint/2010/main" val="1337277195"/>
       </p:ext>
     </p:extLst>
   </p:cSld>
@@ -14131,21 +14324,8 @@
                 <a:ea typeface="ＭＳ Ｐゴシック" pitchFamily="34" charset="-128"/>
                 <a:cs typeface="Verdana"/>
               </a:rPr>
-              <a:t>ntel - that part was not covered in </a:t>
-            </a:r>
-            <a:r>
-              <a:rPr lang="en-US" sz="2400" kern="0" dirty="0" smtClean="0">
-                <a:latin typeface="Verdana"/>
-                <a:ea typeface="ＭＳ Ｐゴシック" pitchFamily="34" charset="-128"/>
-                <a:cs typeface="Verdana"/>
-              </a:rPr>
-              <a:t>the work</a:t>
-            </a:r>
-            <a:endParaRPr lang="en-US" sz="2400" kern="0" dirty="0" smtClean="0">
-              <a:latin typeface="Verdana"/>
-              <a:ea typeface="ＭＳ Ｐゴシック" pitchFamily="34" charset="-128"/>
-              <a:cs typeface="Verdana"/>
-            </a:endParaRPr>
+              <a:t>ntel - that part was not covered in the work</a:t>
+            </a:r>
           </a:p>
           <a:p>
             <a:pPr marL="0" marR="0" lvl="0" indent="0" algn="l" defTabSz="914400" rtl="0" eaLnBrk="1" fontAlgn="base" latinLnBrk="0" hangingPunct="1">
@@ -14206,7 +14386,7 @@
     </p:spTree>
     <p:extLst>
       <p:ext uri="{BB962C8B-B14F-4D97-AF65-F5344CB8AC3E}">
-        <p14:creationId xmlns:p14="http://schemas.microsoft.com/office/powerpoint/2010/main" xmlns="" val="2098000347"/>
+        <p14:creationId xmlns="" xmlns:p14="http://schemas.microsoft.com/office/powerpoint/2010/main" val="2098000347"/>
       </p:ext>
     </p:extLst>
   </p:cSld>
@@ -14363,10 +14543,42 @@
           </a:p>
         </p:txBody>
       </p:sp>
+      <p:pic>
+        <p:nvPicPr>
+          <p:cNvPr id="1026" name="Picture 2"/>
+          <p:cNvPicPr>
+            <a:picLocks noChangeAspect="1" noChangeArrowheads="1"/>
+          </p:cNvPicPr>
+          <p:nvPr/>
+        </p:nvPicPr>
+        <p:blipFill>
+          <a:blip r:embed="rId3" cstate="print"/>
+          <a:srcRect/>
+          <a:stretch>
+            <a:fillRect/>
+          </a:stretch>
+        </p:blipFill>
+        <p:spPr bwMode="auto">
+          <a:xfrm>
+            <a:off x="1219200" y="3581400"/>
+            <a:ext cx="6362700" cy="2076450"/>
+          </a:xfrm>
+          <a:prstGeom prst="rect">
+            <a:avLst/>
+          </a:prstGeom>
+          <a:noFill/>
+          <a:ln w="9525">
+            <a:noFill/>
+            <a:miter lim="800000"/>
+            <a:headEnd/>
+            <a:tailEnd/>
+          </a:ln>
+        </p:spPr>
+      </p:pic>
     </p:spTree>
     <p:extLst>
       <p:ext uri="{BB962C8B-B14F-4D97-AF65-F5344CB8AC3E}">
-        <p14:creationId xmlns:p14="http://schemas.microsoft.com/office/powerpoint/2010/main" xmlns="" val="1312699180"/>
+        <p14:creationId xmlns="" xmlns:p14="http://schemas.microsoft.com/office/powerpoint/2010/main" val="1312699180"/>
       </p:ext>
     </p:extLst>
   </p:cSld>
@@ -14572,7 +14784,7 @@
     </p:spTree>
     <p:extLst>
       <p:ext uri="{BB962C8B-B14F-4D97-AF65-F5344CB8AC3E}">
-        <p14:creationId xmlns:p14="http://schemas.microsoft.com/office/powerpoint/2010/main" xmlns="" val="2098000347"/>
+        <p14:creationId xmlns="" xmlns:p14="http://schemas.microsoft.com/office/powerpoint/2010/main" val="2098000347"/>
       </p:ext>
     </p:extLst>
   </p:cSld>
@@ -14805,7 +15017,7 @@
     </p:spTree>
     <p:extLst>
       <p:ext uri="{BB962C8B-B14F-4D97-AF65-F5344CB8AC3E}">
-        <p14:creationId xmlns:p14="http://schemas.microsoft.com/office/powerpoint/2010/main" xmlns="" val="2098000347"/>
+        <p14:creationId xmlns="" xmlns:p14="http://schemas.microsoft.com/office/powerpoint/2010/main" val="2098000347"/>
       </p:ext>
     </p:extLst>
   </p:cSld>

</xml_diff>

<commit_message>
more fixes to ppt
</commit_message>
<xml_diff>
--- a/Presentation.pptx
+++ b/Presentation.pptx
@@ -221,7 +221,7 @@
             <a:fld id="{207F67E2-BC33-4390-A713-7764078C3DC6}" type="datetimeFigureOut">
               <a:rPr lang="en-US" smtClean="0"/>
               <a:pPr/>
-              <a:t>8/12/2014</a:t>
+              <a:t>8/13/2014</a:t>
             </a:fld>
             <a:endParaRPr lang="en-US"/>
           </a:p>
@@ -668,7 +668,7 @@
     </p:spTree>
     <p:extLst>
       <p:ext uri="{BB962C8B-B14F-4D97-AF65-F5344CB8AC3E}">
-        <p14:creationId xmlns:p14="http://schemas.microsoft.com/office/powerpoint/2010/main" xmlns="" val="2616020464"/>
+        <p14:creationId xmlns="" xmlns:p14="http://schemas.microsoft.com/office/powerpoint/2010/main" val="2616020464"/>
       </p:ext>
     </p:extLst>
   </p:cSld>
@@ -811,7 +811,7 @@
     </p:spTree>
     <p:extLst>
       <p:ext uri="{BB962C8B-B14F-4D97-AF65-F5344CB8AC3E}">
-        <p14:creationId xmlns:p14="http://schemas.microsoft.com/office/powerpoint/2010/main" xmlns="" val="1814285152"/>
+        <p14:creationId xmlns="" xmlns:p14="http://schemas.microsoft.com/office/powerpoint/2010/main" val="1814285152"/>
       </p:ext>
     </p:extLst>
   </p:cSld>
@@ -919,7 +919,7 @@
     </p:spTree>
     <p:extLst>
       <p:ext uri="{BB962C8B-B14F-4D97-AF65-F5344CB8AC3E}">
-        <p14:creationId xmlns:p14="http://schemas.microsoft.com/office/powerpoint/2010/main" xmlns="" val="1814285152"/>
+        <p14:creationId xmlns="" xmlns:p14="http://schemas.microsoft.com/office/powerpoint/2010/main" val="1814285152"/>
       </p:ext>
     </p:extLst>
   </p:cSld>
@@ -1004,7 +1004,7 @@
     </p:spTree>
     <p:extLst>
       <p:ext uri="{BB962C8B-B14F-4D97-AF65-F5344CB8AC3E}">
-        <p14:creationId xmlns:p14="http://schemas.microsoft.com/office/powerpoint/2010/main" xmlns="" val="2532089183"/>
+        <p14:creationId xmlns="" xmlns:p14="http://schemas.microsoft.com/office/powerpoint/2010/main" val="2532089183"/>
       </p:ext>
     </p:extLst>
   </p:cSld>
@@ -1121,7 +1121,7 @@
     </p:spTree>
     <p:extLst>
       <p:ext uri="{BB962C8B-B14F-4D97-AF65-F5344CB8AC3E}">
-        <p14:creationId xmlns:p14="http://schemas.microsoft.com/office/powerpoint/2010/main" xmlns="" val="3122826242"/>
+        <p14:creationId xmlns="" xmlns:p14="http://schemas.microsoft.com/office/powerpoint/2010/main" val="3122826242"/>
       </p:ext>
     </p:extLst>
   </p:cSld>
@@ -1210,7 +1210,7 @@
     </p:spTree>
     <p:extLst>
       <p:ext uri="{BB962C8B-B14F-4D97-AF65-F5344CB8AC3E}">
-        <p14:creationId xmlns:p14="http://schemas.microsoft.com/office/powerpoint/2010/main" xmlns="" val="4226265490"/>
+        <p14:creationId xmlns="" xmlns:p14="http://schemas.microsoft.com/office/powerpoint/2010/main" val="4226265490"/>
       </p:ext>
     </p:extLst>
   </p:cSld>
@@ -1312,7 +1312,7 @@
     </p:spTree>
     <p:extLst>
       <p:ext uri="{BB962C8B-B14F-4D97-AF65-F5344CB8AC3E}">
-        <p14:creationId xmlns:p14="http://schemas.microsoft.com/office/powerpoint/2010/main" xmlns="" val="3969599817"/>
+        <p14:creationId xmlns="" xmlns:p14="http://schemas.microsoft.com/office/powerpoint/2010/main" val="3969599817"/>
       </p:ext>
     </p:extLst>
   </p:cSld>
@@ -1416,7 +1416,7 @@
     </p:spTree>
     <p:extLst>
       <p:ext uri="{BB962C8B-B14F-4D97-AF65-F5344CB8AC3E}">
-        <p14:creationId xmlns:p14="http://schemas.microsoft.com/office/powerpoint/2010/main" xmlns="" val="1138807512"/>
+        <p14:creationId xmlns="" xmlns:p14="http://schemas.microsoft.com/office/powerpoint/2010/main" val="1138807512"/>
       </p:ext>
     </p:extLst>
   </p:cSld>
@@ -1589,7 +1589,7 @@
     </p:spTree>
     <p:extLst>
       <p:ext uri="{BB962C8B-B14F-4D97-AF65-F5344CB8AC3E}">
-        <p14:creationId xmlns:p14="http://schemas.microsoft.com/office/powerpoint/2010/main" xmlns="" val="1138807512"/>
+        <p14:creationId xmlns="" xmlns:p14="http://schemas.microsoft.com/office/powerpoint/2010/main" val="1138807512"/>
       </p:ext>
     </p:extLst>
   </p:cSld>
@@ -1721,7 +1721,7 @@
     </p:spTree>
     <p:extLst>
       <p:ext uri="{BB962C8B-B14F-4D97-AF65-F5344CB8AC3E}">
-        <p14:creationId xmlns:p14="http://schemas.microsoft.com/office/powerpoint/2010/main" xmlns="" val="4003186642"/>
+        <p14:creationId xmlns="" xmlns:p14="http://schemas.microsoft.com/office/powerpoint/2010/main" val="4003186642"/>
       </p:ext>
     </p:extLst>
   </p:cSld>
@@ -1843,7 +1843,7 @@
     </p:spTree>
     <p:extLst>
       <p:ext uri="{BB962C8B-B14F-4D97-AF65-F5344CB8AC3E}">
-        <p14:creationId xmlns:p14="http://schemas.microsoft.com/office/powerpoint/2010/main" xmlns="" val="3695432560"/>
+        <p14:creationId xmlns="" xmlns:p14="http://schemas.microsoft.com/office/powerpoint/2010/main" val="3695432560"/>
       </p:ext>
     </p:extLst>
   </p:cSld>
@@ -2052,7 +2052,7 @@
     </p:spTree>
     <p:extLst>
       <p:ext uri="{BB962C8B-B14F-4D97-AF65-F5344CB8AC3E}">
-        <p14:creationId xmlns:p14="http://schemas.microsoft.com/office/powerpoint/2010/main" xmlns="" val="3804480766"/>
+        <p14:creationId xmlns="" xmlns:p14="http://schemas.microsoft.com/office/powerpoint/2010/main" val="3804480766"/>
       </p:ext>
     </p:extLst>
   </p:cSld>
@@ -2193,7 +2193,7 @@
     </p:spTree>
     <p:extLst>
       <p:ext uri="{BB962C8B-B14F-4D97-AF65-F5344CB8AC3E}">
-        <p14:creationId xmlns:p14="http://schemas.microsoft.com/office/powerpoint/2010/main" xmlns="" val="190619522"/>
+        <p14:creationId xmlns="" xmlns:p14="http://schemas.microsoft.com/office/powerpoint/2010/main" val="190619522"/>
       </p:ext>
     </p:extLst>
   </p:cSld>
@@ -2356,7 +2356,7 @@
     </p:spTree>
     <p:extLst>
       <p:ext uri="{BB962C8B-B14F-4D97-AF65-F5344CB8AC3E}">
-        <p14:creationId xmlns:p14="http://schemas.microsoft.com/office/powerpoint/2010/main" xmlns="" val="261277375"/>
+        <p14:creationId xmlns="" xmlns:p14="http://schemas.microsoft.com/office/powerpoint/2010/main" val="261277375"/>
       </p:ext>
     </p:extLst>
   </p:cSld>
@@ -2454,7 +2454,7 @@
     </p:spTree>
     <p:extLst>
       <p:ext uri="{BB962C8B-B14F-4D97-AF65-F5344CB8AC3E}">
-        <p14:creationId xmlns:p14="http://schemas.microsoft.com/office/powerpoint/2010/main" xmlns="" val="261277375"/>
+        <p14:creationId xmlns="" xmlns:p14="http://schemas.microsoft.com/office/powerpoint/2010/main" val="261277375"/>
       </p:ext>
     </p:extLst>
   </p:cSld>
@@ -2569,7 +2569,7 @@
     </p:spTree>
     <p:extLst>
       <p:ext uri="{BB962C8B-B14F-4D97-AF65-F5344CB8AC3E}">
-        <p14:creationId xmlns:p14="http://schemas.microsoft.com/office/powerpoint/2010/main" xmlns="" val="3064807093"/>
+        <p14:creationId xmlns="" xmlns:p14="http://schemas.microsoft.com/office/powerpoint/2010/main" val="3064807093"/>
       </p:ext>
     </p:extLst>
   </p:cSld>
@@ -2654,7 +2654,7 @@
     </p:spTree>
     <p:extLst>
       <p:ext uri="{BB962C8B-B14F-4D97-AF65-F5344CB8AC3E}">
-        <p14:creationId xmlns:p14="http://schemas.microsoft.com/office/powerpoint/2010/main" xmlns="" val="3103055361"/>
+        <p14:creationId xmlns="" xmlns:p14="http://schemas.microsoft.com/office/powerpoint/2010/main" val="3103055361"/>
       </p:ext>
     </p:extLst>
   </p:cSld>
@@ -2801,7 +2801,7 @@
     </p:spTree>
     <p:extLst>
       <p:ext uri="{BB962C8B-B14F-4D97-AF65-F5344CB8AC3E}">
-        <p14:creationId xmlns:p14="http://schemas.microsoft.com/office/powerpoint/2010/main" xmlns="" val="494263274"/>
+        <p14:creationId xmlns="" xmlns:p14="http://schemas.microsoft.com/office/powerpoint/2010/main" val="494263274"/>
       </p:ext>
     </p:extLst>
   </p:cSld>
@@ -2987,7 +2987,7 @@
     </p:spTree>
     <p:extLst>
       <p:ext uri="{BB962C8B-B14F-4D97-AF65-F5344CB8AC3E}">
-        <p14:creationId xmlns:p14="http://schemas.microsoft.com/office/powerpoint/2010/main" xmlns="" val="494263274"/>
+        <p14:creationId xmlns="" xmlns:p14="http://schemas.microsoft.com/office/powerpoint/2010/main" val="494263274"/>
       </p:ext>
     </p:extLst>
   </p:cSld>
@@ -3191,7 +3191,7 @@
     </p:spTree>
     <p:extLst>
       <p:ext uri="{BB962C8B-B14F-4D97-AF65-F5344CB8AC3E}">
-        <p14:creationId xmlns:p14="http://schemas.microsoft.com/office/powerpoint/2010/main" xmlns="" val="494263274"/>
+        <p14:creationId xmlns="" xmlns:p14="http://schemas.microsoft.com/office/powerpoint/2010/main" val="494263274"/>
       </p:ext>
     </p:extLst>
   </p:cSld>
@@ -3432,7 +3432,7 @@
     </p:spTree>
     <p:extLst>
       <p:ext uri="{BB962C8B-B14F-4D97-AF65-F5344CB8AC3E}">
-        <p14:creationId xmlns:p14="http://schemas.microsoft.com/office/powerpoint/2010/main" xmlns="" val="494263274"/>
+        <p14:creationId xmlns="" xmlns:p14="http://schemas.microsoft.com/office/powerpoint/2010/main" val="494263274"/>
       </p:ext>
     </p:extLst>
   </p:cSld>
@@ -3573,7 +3573,7 @@
     </p:spTree>
     <p:extLst>
       <p:ext uri="{BB962C8B-B14F-4D97-AF65-F5344CB8AC3E}">
-        <p14:creationId xmlns:p14="http://schemas.microsoft.com/office/powerpoint/2010/main" xmlns="" val="494263274"/>
+        <p14:creationId xmlns="" xmlns:p14="http://schemas.microsoft.com/office/powerpoint/2010/main" val="494263274"/>
       </p:ext>
     </p:extLst>
   </p:cSld>
@@ -3697,7 +3697,7 @@
     </p:spTree>
     <p:extLst>
       <p:ext uri="{BB962C8B-B14F-4D97-AF65-F5344CB8AC3E}">
-        <p14:creationId xmlns:p14="http://schemas.microsoft.com/office/powerpoint/2010/main" xmlns="" val="3117802984"/>
+        <p14:creationId xmlns="" xmlns:p14="http://schemas.microsoft.com/office/powerpoint/2010/main" val="3117802984"/>
       </p:ext>
     </p:extLst>
   </p:cSld>
@@ -3889,7 +3889,7 @@
     </p:spTree>
     <p:extLst>
       <p:ext uri="{BB962C8B-B14F-4D97-AF65-F5344CB8AC3E}">
-        <p14:creationId xmlns:p14="http://schemas.microsoft.com/office/powerpoint/2010/main" xmlns="" val="1038479702"/>
+        <p14:creationId xmlns="" xmlns:p14="http://schemas.microsoft.com/office/powerpoint/2010/main" val="1038479702"/>
       </p:ext>
     </p:extLst>
   </p:cSld>
@@ -4043,7 +4043,7 @@
             <a:fld id="{ACDF6120-F1F0-4C60-9FE9-39AC71A9C79D}" type="datetimeFigureOut">
               <a:rPr lang="en-US" smtClean="0"/>
               <a:pPr/>
-              <a:t>8/12/2014</a:t>
+              <a:t>8/13/2014</a:t>
             </a:fld>
             <a:endParaRPr lang="en-US" sz="1600" dirty="0"/>
           </a:p>
@@ -4404,7 +4404,7 @@
             <a:fld id="{ACDF6120-F1F0-4C60-9FE9-39AC71A9C79D}" type="datetimeFigureOut">
               <a:rPr lang="en-US" smtClean="0"/>
               <a:pPr/>
-              <a:t>8/12/2014</a:t>
+              <a:t>8/13/2014</a:t>
             </a:fld>
             <a:endParaRPr lang="en-US"/>
           </a:p>
@@ -4581,7 +4581,7 @@
             <a:fld id="{ACDF6120-F1F0-4C60-9FE9-39AC71A9C79D}" type="datetimeFigureOut">
               <a:rPr lang="en-US" smtClean="0"/>
               <a:pPr/>
-              <a:t>8/12/2014</a:t>
+              <a:t>8/13/2014</a:t>
             </a:fld>
             <a:endParaRPr lang="en-US"/>
           </a:p>
@@ -4818,7 +4818,7 @@
             <a:fld id="{ACDF6120-F1F0-4C60-9FE9-39AC71A9C79D}" type="datetimeFigureOut">
               <a:rPr lang="en-US" smtClean="0"/>
               <a:pPr/>
-              <a:t>8/12/2014</a:t>
+              <a:t>8/13/2014</a:t>
             </a:fld>
             <a:endParaRPr lang="en-US" dirty="0"/>
           </a:p>
@@ -5089,7 +5089,7 @@
             <a:fld id="{ACDF6120-F1F0-4C60-9FE9-39AC71A9C79D}" type="datetimeFigureOut">
               <a:rPr lang="en-US" smtClean="0"/>
               <a:pPr/>
-              <a:t>8/12/2014</a:t>
+              <a:t>8/13/2014</a:t>
             </a:fld>
             <a:endParaRPr lang="en-US" dirty="0"/>
           </a:p>
@@ -5311,7 +5311,7 @@
             <a:fld id="{ACDF6120-F1F0-4C60-9FE9-39AC71A9C79D}" type="datetimeFigureOut">
               <a:rPr lang="en-US" smtClean="0"/>
               <a:pPr/>
-              <a:t>8/12/2014</a:t>
+              <a:t>8/13/2014</a:t>
             </a:fld>
             <a:endParaRPr lang="en-US"/>
           </a:p>
@@ -5665,7 +5665,7 @@
             <a:fld id="{ACDF6120-F1F0-4C60-9FE9-39AC71A9C79D}" type="datetimeFigureOut">
               <a:rPr lang="en-US" smtClean="0"/>
               <a:pPr/>
-              <a:t>8/12/2014</a:t>
+              <a:t>8/13/2014</a:t>
             </a:fld>
             <a:endParaRPr lang="en-US"/>
           </a:p>
@@ -5899,7 +5899,7 @@
             <a:fld id="{ACDF6120-F1F0-4C60-9FE9-39AC71A9C79D}" type="datetimeFigureOut">
               <a:rPr lang="en-US" smtClean="0"/>
               <a:pPr/>
-              <a:t>8/12/2014</a:t>
+              <a:t>8/13/2014</a:t>
             </a:fld>
             <a:endParaRPr lang="en-US"/>
           </a:p>
@@ -6041,7 +6041,7 @@
             <a:fld id="{ACDF6120-F1F0-4C60-9FE9-39AC71A9C79D}" type="datetimeFigureOut">
               <a:rPr lang="en-US" smtClean="0"/>
               <a:pPr/>
-              <a:t>8/12/2014</a:t>
+              <a:t>8/13/2014</a:t>
             </a:fld>
             <a:endParaRPr lang="en-US"/>
           </a:p>
@@ -6320,7 +6320,7 @@
             <a:fld id="{ACDF6120-F1F0-4C60-9FE9-39AC71A9C79D}" type="datetimeFigureOut">
               <a:rPr lang="en-US" smtClean="0"/>
               <a:pPr/>
-              <a:t>8/12/2014</a:t>
+              <a:t>8/13/2014</a:t>
             </a:fld>
             <a:endParaRPr lang="en-US"/>
           </a:p>
@@ -6729,7 +6729,7 @@
             <a:fld id="{ACDF6120-F1F0-4C60-9FE9-39AC71A9C79D}" type="datetimeFigureOut">
               <a:rPr lang="en-US" smtClean="0"/>
               <a:pPr/>
-              <a:t>8/12/2014</a:t>
+              <a:t>8/13/2014</a:t>
             </a:fld>
             <a:endParaRPr lang="en-US"/>
           </a:p>
@@ -7069,7 +7069,7 @@
             <a:fld id="{ACDF6120-F1F0-4C60-9FE9-39AC71A9C79D}" type="datetimeFigureOut">
               <a:rPr lang="en-US" smtClean="0"/>
               <a:pPr/>
-              <a:t>8/12/2014</a:t>
+              <a:t>8/13/2014</a:t>
             </a:fld>
             <a:endParaRPr lang="en-US" sz="1400" dirty="0">
               <a:solidFill>
@@ -8005,7 +8005,7 @@
           <a:blip r:embed="rId3" cstate="print">
             <a:extLst>
               <a:ext uri="{28A0092B-C50C-407E-A947-70E740481C1C}">
-                <a14:useLocalDpi xmlns:a14="http://schemas.microsoft.com/office/drawing/2010/main" xmlns="" val="0"/>
+                <a14:useLocalDpi xmlns="" xmlns:a14="http://schemas.microsoft.com/office/drawing/2010/main" val="0"/>
               </a:ext>
             </a:extLst>
           </a:blip>
@@ -8029,14 +8029,14 @@
           <a:effectLst/>
           <a:extLst>
             <a:ext uri="{909E8E84-426E-40DD-AFC4-6F175D3DCCD1}">
-              <a14:hiddenFill xmlns:a14="http://schemas.microsoft.com/office/drawing/2010/main" xmlns="">
+              <a14:hiddenFill xmlns="" xmlns:a14="http://schemas.microsoft.com/office/drawing/2010/main">
                 <a:solidFill>
                   <a:schemeClr val="accent1"/>
                 </a:solidFill>
               </a14:hiddenFill>
             </a:ext>
             <a:ext uri="{91240B29-F687-4F45-9708-019B960494DF}">
-              <a14:hiddenLine xmlns:a14="http://schemas.microsoft.com/office/drawing/2010/main" xmlns="" w="9525">
+              <a14:hiddenLine xmlns="" xmlns:a14="http://schemas.microsoft.com/office/drawing/2010/main" w="9525">
                 <a:solidFill>
                   <a:schemeClr val="tx1"/>
                 </a:solidFill>
@@ -8046,7 +8046,7 @@
               </a14:hiddenLine>
             </a:ext>
             <a:ext uri="{AF507438-7753-43E0-B8FC-AC1667EBCBE1}">
-              <a14:hiddenEffects xmlns:a14="http://schemas.microsoft.com/office/drawing/2010/main" xmlns="">
+              <a14:hiddenEffects xmlns="" xmlns:a14="http://schemas.microsoft.com/office/drawing/2010/main">
                 <a:effectLst>
                   <a:outerShdw dist="35921" dir="2700000" algn="ctr" rotWithShape="0">
                     <a:schemeClr val="bg2"/>
@@ -8060,7 +8060,7 @@
     </p:spTree>
     <p:extLst>
       <p:ext uri="{BB962C8B-B14F-4D97-AF65-F5344CB8AC3E}">
-        <p14:creationId xmlns:p14="http://schemas.microsoft.com/office/powerpoint/2010/main" xmlns="" val="156881095"/>
+        <p14:creationId xmlns="" xmlns:p14="http://schemas.microsoft.com/office/powerpoint/2010/main" val="156881095"/>
       </p:ext>
     </p:extLst>
   </p:cSld>
@@ -8327,7 +8327,7 @@
           <a:blip r:embed="rId3" cstate="print">
             <a:extLst>
               <a:ext uri="{28A0092B-C50C-407E-A947-70E740481C1C}">
-                <a14:useLocalDpi xmlns:a14="http://schemas.microsoft.com/office/drawing/2010/main" xmlns="" val="0"/>
+                <a14:useLocalDpi xmlns="" xmlns:a14="http://schemas.microsoft.com/office/drawing/2010/main" val="0"/>
               </a:ext>
             </a:extLst>
           </a:blip>
@@ -8351,14 +8351,14 @@
           <a:effectLst/>
           <a:extLst>
             <a:ext uri="{909E8E84-426E-40DD-AFC4-6F175D3DCCD1}">
-              <a14:hiddenFill xmlns:a14="http://schemas.microsoft.com/office/drawing/2010/main" xmlns="">
+              <a14:hiddenFill xmlns="" xmlns:a14="http://schemas.microsoft.com/office/drawing/2010/main">
                 <a:solidFill>
                   <a:schemeClr val="accent1"/>
                 </a:solidFill>
               </a14:hiddenFill>
             </a:ext>
             <a:ext uri="{91240B29-F687-4F45-9708-019B960494DF}">
-              <a14:hiddenLine xmlns:a14="http://schemas.microsoft.com/office/drawing/2010/main" xmlns="" w="9525">
+              <a14:hiddenLine xmlns="" xmlns:a14="http://schemas.microsoft.com/office/drawing/2010/main" w="9525">
                 <a:solidFill>
                   <a:schemeClr val="tx1"/>
                 </a:solidFill>
@@ -8368,7 +8368,7 @@
               </a14:hiddenLine>
             </a:ext>
             <a:ext uri="{AF507438-7753-43E0-B8FC-AC1667EBCBE1}">
-              <a14:hiddenEffects xmlns:a14="http://schemas.microsoft.com/office/drawing/2010/main" xmlns="">
+              <a14:hiddenEffects xmlns="" xmlns:a14="http://schemas.microsoft.com/office/drawing/2010/main">
                 <a:effectLst>
                   <a:outerShdw dist="35921" dir="2700000" algn="ctr" rotWithShape="0">
                     <a:schemeClr val="bg2"/>
@@ -8382,7 +8382,7 @@
     </p:spTree>
     <p:extLst>
       <p:ext uri="{BB962C8B-B14F-4D97-AF65-F5344CB8AC3E}">
-        <p14:creationId xmlns:p14="http://schemas.microsoft.com/office/powerpoint/2010/main" xmlns="" val="1172241827"/>
+        <p14:creationId xmlns="" xmlns:p14="http://schemas.microsoft.com/office/powerpoint/2010/main" val="1172241827"/>
       </p:ext>
     </p:extLst>
   </p:cSld>
@@ -8573,7 +8573,7 @@
     </p:spTree>
     <p:extLst>
       <p:ext uri="{BB962C8B-B14F-4D97-AF65-F5344CB8AC3E}">
-        <p14:creationId xmlns:p14="http://schemas.microsoft.com/office/powerpoint/2010/main" xmlns="" val="88608496"/>
+        <p14:creationId xmlns="" xmlns:p14="http://schemas.microsoft.com/office/powerpoint/2010/main" val="88608496"/>
       </p:ext>
     </p:extLst>
   </p:cSld>
@@ -8784,7 +8784,7 @@
     </p:spTree>
     <p:extLst>
       <p:ext uri="{BB962C8B-B14F-4D97-AF65-F5344CB8AC3E}">
-        <p14:creationId xmlns:p14="http://schemas.microsoft.com/office/powerpoint/2010/main" xmlns="" val="3934171707"/>
+        <p14:creationId xmlns="" xmlns:p14="http://schemas.microsoft.com/office/powerpoint/2010/main" val="3934171707"/>
       </p:ext>
     </p:extLst>
   </p:cSld>
@@ -9004,7 +9004,7 @@
           <a:blip r:embed="rId3" cstate="print">
             <a:extLst>
               <a:ext uri="{28A0092B-C50C-407E-A947-70E740481C1C}">
-                <a14:useLocalDpi xmlns:a14="http://schemas.microsoft.com/office/drawing/2010/main" xmlns="" val="0"/>
+                <a14:useLocalDpi xmlns="" xmlns:a14="http://schemas.microsoft.com/office/drawing/2010/main" val="0"/>
               </a:ext>
             </a:extLst>
           </a:blip>
@@ -9028,14 +9028,14 @@
           <a:effectLst/>
           <a:extLst>
             <a:ext uri="{909E8E84-426E-40DD-AFC4-6F175D3DCCD1}">
-              <a14:hiddenFill xmlns:a14="http://schemas.microsoft.com/office/drawing/2010/main" xmlns="">
+              <a14:hiddenFill xmlns="" xmlns:a14="http://schemas.microsoft.com/office/drawing/2010/main">
                 <a:solidFill>
                   <a:schemeClr val="accent1"/>
                 </a:solidFill>
               </a14:hiddenFill>
             </a:ext>
             <a:ext uri="{91240B29-F687-4F45-9708-019B960494DF}">
-              <a14:hiddenLine xmlns:a14="http://schemas.microsoft.com/office/drawing/2010/main" xmlns="" w="9525">
+              <a14:hiddenLine xmlns="" xmlns:a14="http://schemas.microsoft.com/office/drawing/2010/main" w="9525">
                 <a:solidFill>
                   <a:schemeClr val="tx1"/>
                 </a:solidFill>
@@ -9045,7 +9045,7 @@
               </a14:hiddenLine>
             </a:ext>
             <a:ext uri="{AF507438-7753-43E0-B8FC-AC1667EBCBE1}">
-              <a14:hiddenEffects xmlns:a14="http://schemas.microsoft.com/office/drawing/2010/main" xmlns="">
+              <a14:hiddenEffects xmlns="" xmlns:a14="http://schemas.microsoft.com/office/drawing/2010/main">
                 <a:effectLst>
                   <a:outerShdw dist="35921" dir="2700000" algn="ctr" rotWithShape="0">
                     <a:schemeClr val="bg2"/>
@@ -9059,7 +9059,7 @@
     </p:spTree>
     <p:extLst>
       <p:ext uri="{BB962C8B-B14F-4D97-AF65-F5344CB8AC3E}">
-        <p14:creationId xmlns:p14="http://schemas.microsoft.com/office/powerpoint/2010/main" xmlns="" val="2161871131"/>
+        <p14:creationId xmlns="" xmlns:p14="http://schemas.microsoft.com/office/powerpoint/2010/main" val="2161871131"/>
       </p:ext>
     </p:extLst>
   </p:cSld>
@@ -9242,7 +9242,7 @@
     </p:spTree>
     <p:extLst>
       <p:ext uri="{BB962C8B-B14F-4D97-AF65-F5344CB8AC3E}">
-        <p14:creationId xmlns:p14="http://schemas.microsoft.com/office/powerpoint/2010/main" xmlns="" val="258686234"/>
+        <p14:creationId xmlns="" xmlns:p14="http://schemas.microsoft.com/office/powerpoint/2010/main" val="258686234"/>
       </p:ext>
     </p:extLst>
   </p:cSld>
@@ -9431,7 +9431,7 @@
           <a:blip r:embed="rId3" cstate="print">
             <a:extLst>
               <a:ext uri="{28A0092B-C50C-407E-A947-70E740481C1C}">
-                <a14:useLocalDpi xmlns:a14="http://schemas.microsoft.com/office/drawing/2010/main" xmlns="" val="0"/>
+                <a14:useLocalDpi xmlns="" xmlns:a14="http://schemas.microsoft.com/office/drawing/2010/main" val="0"/>
               </a:ext>
             </a:extLst>
           </a:blip>
@@ -9455,14 +9455,14 @@
           <a:effectLst/>
           <a:extLst>
             <a:ext uri="{909E8E84-426E-40DD-AFC4-6F175D3DCCD1}">
-              <a14:hiddenFill xmlns:a14="http://schemas.microsoft.com/office/drawing/2010/main" xmlns="">
+              <a14:hiddenFill xmlns="" xmlns:a14="http://schemas.microsoft.com/office/drawing/2010/main">
                 <a:solidFill>
                   <a:schemeClr val="accent1"/>
                 </a:solidFill>
               </a14:hiddenFill>
             </a:ext>
             <a:ext uri="{91240B29-F687-4F45-9708-019B960494DF}">
-              <a14:hiddenLine xmlns:a14="http://schemas.microsoft.com/office/drawing/2010/main" xmlns="" w="9525">
+              <a14:hiddenLine xmlns="" xmlns:a14="http://schemas.microsoft.com/office/drawing/2010/main" w="9525">
                 <a:solidFill>
                   <a:schemeClr val="tx1"/>
                 </a:solidFill>
@@ -9472,7 +9472,7 @@
               </a14:hiddenLine>
             </a:ext>
             <a:ext uri="{AF507438-7753-43E0-B8FC-AC1667EBCBE1}">
-              <a14:hiddenEffects xmlns:a14="http://schemas.microsoft.com/office/drawing/2010/main" xmlns="">
+              <a14:hiddenEffects xmlns="" xmlns:a14="http://schemas.microsoft.com/office/drawing/2010/main">
                 <a:effectLst>
                   <a:outerShdw dist="35921" dir="2700000" algn="ctr" rotWithShape="0">
                     <a:schemeClr val="bg2"/>
@@ -9486,7 +9486,7 @@
     </p:spTree>
     <p:extLst>
       <p:ext uri="{BB962C8B-B14F-4D97-AF65-F5344CB8AC3E}">
-        <p14:creationId xmlns:p14="http://schemas.microsoft.com/office/powerpoint/2010/main" xmlns="" val="1549667041"/>
+        <p14:creationId xmlns="" xmlns:p14="http://schemas.microsoft.com/office/powerpoint/2010/main" val="1549667041"/>
       </p:ext>
     </p:extLst>
   </p:cSld>
@@ -9675,7 +9675,7 @@
     </p:spTree>
     <p:extLst>
       <p:ext uri="{BB962C8B-B14F-4D97-AF65-F5344CB8AC3E}">
-        <p14:creationId xmlns:p14="http://schemas.microsoft.com/office/powerpoint/2010/main" xmlns="" val="1193325034"/>
+        <p14:creationId xmlns="" xmlns:p14="http://schemas.microsoft.com/office/powerpoint/2010/main" val="1193325034"/>
       </p:ext>
     </p:extLst>
   </p:cSld>
@@ -9877,7 +9877,7 @@
     </p:spTree>
     <p:extLst>
       <p:ext uri="{BB962C8B-B14F-4D97-AF65-F5344CB8AC3E}">
-        <p14:creationId xmlns:p14="http://schemas.microsoft.com/office/powerpoint/2010/main" xmlns="" val="3495113006"/>
+        <p14:creationId xmlns="" xmlns:p14="http://schemas.microsoft.com/office/powerpoint/2010/main" val="3495113006"/>
       </p:ext>
     </p:extLst>
   </p:cSld>
@@ -10060,7 +10060,7 @@
     </p:spTree>
     <p:extLst>
       <p:ext uri="{BB962C8B-B14F-4D97-AF65-F5344CB8AC3E}">
-        <p14:creationId xmlns:p14="http://schemas.microsoft.com/office/powerpoint/2010/main" xmlns="" val="1193325034"/>
+        <p14:creationId xmlns="" xmlns:p14="http://schemas.microsoft.com/office/powerpoint/2010/main" val="1193325034"/>
       </p:ext>
     </p:extLst>
   </p:cSld>
@@ -10411,7 +10411,7 @@
     </p:spTree>
     <p:extLst>
       <p:ext uri="{BB962C8B-B14F-4D97-AF65-F5344CB8AC3E}">
-        <p14:creationId xmlns:p14="http://schemas.microsoft.com/office/powerpoint/2010/main" xmlns="" val="1352295260"/>
+        <p14:creationId xmlns="" xmlns:p14="http://schemas.microsoft.com/office/powerpoint/2010/main" val="1352295260"/>
       </p:ext>
     </p:extLst>
   </p:cSld>
@@ -10597,7 +10597,7 @@
           <a:blip r:embed="rId3" cstate="print">
             <a:extLst>
               <a:ext uri="{28A0092B-C50C-407E-A947-70E740481C1C}">
-                <a14:useLocalDpi xmlns:a14="http://schemas.microsoft.com/office/drawing/2010/main" xmlns="" val="0"/>
+                <a14:useLocalDpi xmlns="" xmlns:a14="http://schemas.microsoft.com/office/drawing/2010/main" val="0"/>
               </a:ext>
             </a:extLst>
           </a:blip>
@@ -10621,14 +10621,14 @@
           <a:effectLst/>
           <a:extLst>
             <a:ext uri="{909E8E84-426E-40DD-AFC4-6F175D3DCCD1}">
-              <a14:hiddenFill xmlns:a14="http://schemas.microsoft.com/office/drawing/2010/main" xmlns="">
+              <a14:hiddenFill xmlns="" xmlns:a14="http://schemas.microsoft.com/office/drawing/2010/main">
                 <a:solidFill>
                   <a:schemeClr val="accent1"/>
                 </a:solidFill>
               </a14:hiddenFill>
             </a:ext>
             <a:ext uri="{91240B29-F687-4F45-9708-019B960494DF}">
-              <a14:hiddenLine xmlns:a14="http://schemas.microsoft.com/office/drawing/2010/main" xmlns="" w="9525">
+              <a14:hiddenLine xmlns="" xmlns:a14="http://schemas.microsoft.com/office/drawing/2010/main" w="9525">
                 <a:solidFill>
                   <a:schemeClr val="tx1"/>
                 </a:solidFill>
@@ -10638,7 +10638,7 @@
               </a14:hiddenLine>
             </a:ext>
             <a:ext uri="{AF507438-7753-43E0-B8FC-AC1667EBCBE1}">
-              <a14:hiddenEffects xmlns:a14="http://schemas.microsoft.com/office/drawing/2010/main" xmlns="">
+              <a14:hiddenEffects xmlns="" xmlns:a14="http://schemas.microsoft.com/office/drawing/2010/main">
                 <a:effectLst>
                   <a:outerShdw dist="35921" dir="2700000" algn="ctr" rotWithShape="0">
                     <a:schemeClr val="bg2"/>
@@ -10652,7 +10652,7 @@
     </p:spTree>
     <p:extLst>
       <p:ext uri="{BB962C8B-B14F-4D97-AF65-F5344CB8AC3E}">
-        <p14:creationId xmlns:p14="http://schemas.microsoft.com/office/powerpoint/2010/main" xmlns="" val="1990835183"/>
+        <p14:creationId xmlns="" xmlns:p14="http://schemas.microsoft.com/office/powerpoint/2010/main" val="1990835183"/>
       </p:ext>
     </p:extLst>
   </p:cSld>
@@ -10835,7 +10835,7 @@
     </p:spTree>
     <p:extLst>
       <p:ext uri="{BB962C8B-B14F-4D97-AF65-F5344CB8AC3E}">
-        <p14:creationId xmlns:p14="http://schemas.microsoft.com/office/powerpoint/2010/main" xmlns="" val="537376198"/>
+        <p14:creationId xmlns="" xmlns:p14="http://schemas.microsoft.com/office/powerpoint/2010/main" val="537376198"/>
       </p:ext>
     </p:extLst>
   </p:cSld>
@@ -11272,7 +11272,7 @@
     </p:spTree>
     <p:extLst>
       <p:ext uri="{BB962C8B-B14F-4D97-AF65-F5344CB8AC3E}">
-        <p14:creationId xmlns:p14="http://schemas.microsoft.com/office/powerpoint/2010/main" xmlns="" val="2627711932"/>
+        <p14:creationId xmlns="" xmlns:p14="http://schemas.microsoft.com/office/powerpoint/2010/main" val="2627711932"/>
       </p:ext>
     </p:extLst>
   </p:cSld>
@@ -11468,23 +11468,7 @@
                 <a:ea typeface="ＭＳ Ｐゴシック" pitchFamily="34" charset="-128"/>
                 <a:cs typeface="Verdana"/>
               </a:rPr>
-              <a:t> </a:t>
-            </a:r>
-            <a:r>
-              <a:rPr lang="en-US" sz="2400" kern="0" noProof="0" dirty="0" smtClean="0">
-                <a:latin typeface="Verdana"/>
-                <a:ea typeface="ＭＳ Ｐゴシック" pitchFamily="34" charset="-128"/>
-                <a:cs typeface="Verdana"/>
-              </a:rPr>
-              <a:t>9-13 </a:t>
-            </a:r>
-            <a:r>
-              <a:rPr lang="en-US" sz="2400" kern="0" noProof="0" dirty="0" smtClean="0">
-                <a:latin typeface="Verdana"/>
-                <a:ea typeface="ＭＳ Ｐゴシック" pitchFamily="34" charset="-128"/>
-                <a:cs typeface="Verdana"/>
-              </a:rPr>
-              <a:t>million jobs</a:t>
+              <a:t> 9-13 million jobs</a:t>
             </a:r>
           </a:p>
           <a:p>
@@ -11552,7 +11536,7 @@
     </p:spTree>
     <p:extLst>
       <p:ext uri="{BB962C8B-B14F-4D97-AF65-F5344CB8AC3E}">
-        <p14:creationId xmlns:p14="http://schemas.microsoft.com/office/powerpoint/2010/main" xmlns="" val="537376198"/>
+        <p14:creationId xmlns="" xmlns:p14="http://schemas.microsoft.com/office/powerpoint/2010/main" val="537376198"/>
       </p:ext>
     </p:extLst>
   </p:cSld>
@@ -11685,7 +11669,7 @@
           <a:blip r:embed="rId3" cstate="print">
             <a:extLst>
               <a:ext uri="{28A0092B-C50C-407E-A947-70E740481C1C}">
-                <a14:useLocalDpi xmlns:a14="http://schemas.microsoft.com/office/drawing/2010/main" xmlns="" val="0"/>
+                <a14:useLocalDpi xmlns="" xmlns:a14="http://schemas.microsoft.com/office/drawing/2010/main" val="0"/>
               </a:ext>
             </a:extLst>
           </a:blip>
@@ -11709,14 +11693,14 @@
           <a:effectLst/>
           <a:extLst>
             <a:ext uri="{909E8E84-426E-40DD-AFC4-6F175D3DCCD1}">
-              <a14:hiddenFill xmlns:a14="http://schemas.microsoft.com/office/drawing/2010/main" xmlns="">
+              <a14:hiddenFill xmlns="" xmlns:a14="http://schemas.microsoft.com/office/drawing/2010/main">
                 <a:solidFill>
                   <a:schemeClr val="accent1"/>
                 </a:solidFill>
               </a14:hiddenFill>
             </a:ext>
             <a:ext uri="{91240B29-F687-4F45-9708-019B960494DF}">
-              <a14:hiddenLine xmlns:a14="http://schemas.microsoft.com/office/drawing/2010/main" xmlns="" w="9525">
+              <a14:hiddenLine xmlns="" xmlns:a14="http://schemas.microsoft.com/office/drawing/2010/main" w="9525">
                 <a:solidFill>
                   <a:schemeClr val="tx1"/>
                 </a:solidFill>
@@ -11726,7 +11710,7 @@
               </a14:hiddenLine>
             </a:ext>
             <a:ext uri="{AF507438-7753-43E0-B8FC-AC1667EBCBE1}">
-              <a14:hiddenEffects xmlns:a14="http://schemas.microsoft.com/office/drawing/2010/main" xmlns="">
+              <a14:hiddenEffects xmlns="" xmlns:a14="http://schemas.microsoft.com/office/drawing/2010/main">
                 <a:effectLst>
                   <a:outerShdw dist="35921" dir="2700000" algn="ctr" rotWithShape="0">
                     <a:schemeClr val="bg2"/>
@@ -11740,7 +11724,7 @@
     </p:spTree>
     <p:extLst>
       <p:ext uri="{BB962C8B-B14F-4D97-AF65-F5344CB8AC3E}">
-        <p14:creationId xmlns:p14="http://schemas.microsoft.com/office/powerpoint/2010/main" xmlns="" val="496337132"/>
+        <p14:creationId xmlns="" xmlns:p14="http://schemas.microsoft.com/office/powerpoint/2010/main" val="496337132"/>
       </p:ext>
     </p:extLst>
   </p:cSld>
@@ -11873,7 +11857,7 @@
           <a:blip r:embed="rId3" cstate="print">
             <a:extLst>
               <a:ext uri="{28A0092B-C50C-407E-A947-70E740481C1C}">
-                <a14:useLocalDpi xmlns:a14="http://schemas.microsoft.com/office/drawing/2010/main" xmlns="" val="0"/>
+                <a14:useLocalDpi xmlns="" xmlns:a14="http://schemas.microsoft.com/office/drawing/2010/main" val="0"/>
               </a:ext>
             </a:extLst>
           </a:blip>
@@ -11897,14 +11881,14 @@
           <a:effectLst/>
           <a:extLst>
             <a:ext uri="{909E8E84-426E-40DD-AFC4-6F175D3DCCD1}">
-              <a14:hiddenFill xmlns:a14="http://schemas.microsoft.com/office/drawing/2010/main" xmlns="">
+              <a14:hiddenFill xmlns="" xmlns:a14="http://schemas.microsoft.com/office/drawing/2010/main">
                 <a:solidFill>
                   <a:schemeClr val="accent1"/>
                 </a:solidFill>
               </a14:hiddenFill>
             </a:ext>
             <a:ext uri="{91240B29-F687-4F45-9708-019B960494DF}">
-              <a14:hiddenLine xmlns:a14="http://schemas.microsoft.com/office/drawing/2010/main" xmlns="" w="9525">
+              <a14:hiddenLine xmlns="" xmlns:a14="http://schemas.microsoft.com/office/drawing/2010/main" w="9525">
                 <a:solidFill>
                   <a:schemeClr val="tx1"/>
                 </a:solidFill>
@@ -11914,7 +11898,7 @@
               </a14:hiddenLine>
             </a:ext>
             <a:ext uri="{AF507438-7753-43E0-B8FC-AC1667EBCBE1}">
-              <a14:hiddenEffects xmlns:a14="http://schemas.microsoft.com/office/drawing/2010/main" xmlns="">
+              <a14:hiddenEffects xmlns="" xmlns:a14="http://schemas.microsoft.com/office/drawing/2010/main">
                 <a:effectLst>
                   <a:outerShdw dist="35921" dir="2700000" algn="ctr" rotWithShape="0">
                     <a:schemeClr val="bg2"/>
@@ -11928,7 +11912,7 @@
     </p:spTree>
     <p:extLst>
       <p:ext uri="{BB962C8B-B14F-4D97-AF65-F5344CB8AC3E}">
-        <p14:creationId xmlns:p14="http://schemas.microsoft.com/office/powerpoint/2010/main" xmlns="" val="300159156"/>
+        <p14:creationId xmlns="" xmlns:p14="http://schemas.microsoft.com/office/powerpoint/2010/main" val="300159156"/>
       </p:ext>
     </p:extLst>
   </p:cSld>
@@ -12219,7 +12203,7 @@
                 <a:ea typeface="ＭＳ Ｐゴシック" pitchFamily="34" charset="-128"/>
                 <a:cs typeface="Verdana"/>
               </a:rPr>
-              <a:t>:</a:t>
+              <a:t>: Mix-Fit &amp; Max-Jobs</a:t>
             </a:r>
           </a:p>
           <a:p>
@@ -12231,89 +12215,20 @@
               <a:buChar char="•"/>
             </a:pPr>
             <a:r>
-              <a:rPr lang="en-US" sz="2000" kern="0" dirty="0" smtClean="0">
+              <a:rPr lang="en-US" sz="2400" kern="0" dirty="0" smtClean="0">
                 <a:ea typeface="ＭＳ Ｐゴシック" pitchFamily="34" charset="-128"/>
                 <a:cs typeface="Verdana"/>
               </a:rPr>
-              <a:t>Heuristics focus on a single resource, either cores or memory </a:t>
-            </a:r>
-            <a:r>
-              <a:rPr lang="en-US" sz="2000" kern="0" dirty="0" smtClean="0">
-                <a:solidFill>
-                  <a:srgbClr val="FF0000"/>
-                </a:solidFill>
-                <a:ea typeface="ＭＳ Ｐゴシック" pitchFamily="34" charset="-128"/>
-                <a:cs typeface="Verdana"/>
-                <a:sym typeface="Wingdings" pitchFamily="2" charset="2"/>
-              </a:rPr>
-              <a:t></a:t>
-            </a:r>
-            <a:r>
-              <a:rPr lang="en-US" sz="2000" kern="0" dirty="0" smtClean="0">
-                <a:ea typeface="ＭＳ Ｐゴシック" pitchFamily="34" charset="-128"/>
-                <a:cs typeface="Verdana"/>
-                <a:sym typeface="Wingdings" pitchFamily="2" charset="2"/>
-              </a:rPr>
-              <a:t> </a:t>
-            </a:r>
-            <a:r>
-              <a:rPr lang="en-US" sz="2000" kern="0" dirty="0" smtClean="0">
-                <a:solidFill>
-                  <a:schemeClr val="accent1"/>
-                </a:solidFill>
+              <a:t>Implementation in Intel is </a:t>
+            </a:r>
+            <a:r>
+              <a:rPr lang="en-US" sz="2400" kern="0" smtClean="0">
                 <a:ea typeface="ＭＳ Ｐゴシック" pitchFamily="34" charset="-128"/>
                 <a:cs typeface="Verdana"/>
               </a:rPr>
-              <a:t>We implemented Mix-Fit</a:t>
-            </a:r>
-          </a:p>
-          <a:p>
-            <a:pPr lvl="1">
-              <a:lnSpc>
-                <a:spcPct val="150000"/>
-              </a:lnSpc>
-              <a:buFont typeface="Arial" pitchFamily="34" charset="0"/>
-              <a:buChar char="•"/>
-            </a:pPr>
-            <a:r>
-              <a:rPr lang="en-US" sz="2000" kern="0" dirty="0" smtClean="0">
-                <a:ea typeface="ＭＳ Ｐゴシック" pitchFamily="34" charset="-128"/>
-                <a:cs typeface="Verdana"/>
-              </a:rPr>
-              <a:t>The nature of dynamically changing demands prevent a specific use case-tailored algorithm to be optimal for all cases </a:t>
-            </a:r>
-            <a:r>
-              <a:rPr lang="en-US" sz="2000" kern="0" dirty="0" smtClean="0">
-                <a:solidFill>
-                  <a:srgbClr val="FF0000"/>
-                </a:solidFill>
-                <a:ea typeface="ＭＳ Ｐゴシック" pitchFamily="34" charset="-128"/>
-                <a:cs typeface="Verdana"/>
-                <a:sym typeface="Wingdings" pitchFamily="2" charset="2"/>
-              </a:rPr>
-              <a:t></a:t>
-            </a:r>
-            <a:r>
-              <a:rPr lang="en-US" sz="2000" kern="0" dirty="0" smtClean="0">
-                <a:ea typeface="ＭＳ Ｐゴシック" pitchFamily="34" charset="-128"/>
-                <a:cs typeface="Verdana"/>
-              </a:rPr>
-              <a:t> </a:t>
-            </a:r>
-            <a:r>
-              <a:rPr lang="en-US" sz="2000" kern="0" dirty="0" smtClean="0">
-                <a:solidFill>
-                  <a:schemeClr val="accent1"/>
-                </a:solidFill>
-                <a:ea typeface="ＭＳ Ｐゴシック" pitchFamily="34" charset="-128"/>
-                <a:cs typeface="Verdana"/>
-              </a:rPr>
-              <a:t>We suggest Max-Jobs meta-heuristic</a:t>
-            </a:r>
-            <a:endParaRPr lang="en-US" sz="2000" kern="0" dirty="0">
-              <a:solidFill>
-                <a:schemeClr val="accent1"/>
-              </a:solidFill>
+              <a:t>still on-going.</a:t>
+            </a:r>
+            <a:endParaRPr lang="en-US" sz="2400" kern="0" dirty="0" smtClean="0">
               <a:ea typeface="ＭＳ Ｐゴシック" pitchFamily="34" charset="-128"/>
               <a:cs typeface="Verdana"/>
             </a:endParaRPr>
@@ -12335,47 +12250,15 @@
                 <a:ea typeface="ＭＳ Ｐゴシック" pitchFamily="34" charset="-128"/>
                 <a:cs typeface="Verdana"/>
               </a:rPr>
-              <a:t>Other contributions: </a:t>
+              <a:t>Other </a:t>
             </a:r>
             <a:r>
               <a:rPr lang="en-US" sz="2200" kern="0" dirty="0" smtClean="0">
                 <a:ea typeface="ＭＳ Ｐゴシック" pitchFamily="34" charset="-128"/>
                 <a:cs typeface="Verdana"/>
               </a:rPr>
-              <a:t>P</a:t>
-            </a:r>
-            <a:r>
-              <a:rPr lang="en-US" sz="2200" kern="0" dirty="0" smtClean="0">
-                <a:ea typeface="ＭＳ Ｐゴシック" pitchFamily="34" charset="-128"/>
-                <a:cs typeface="Verdana"/>
-              </a:rPr>
-              <a:t>ublic </a:t>
-            </a:r>
-            <a:r>
-              <a:rPr lang="en-US" sz="2200" kern="0" dirty="0" smtClean="0">
-                <a:ea typeface="ＭＳ Ｐゴシック" pitchFamily="34" charset="-128"/>
-                <a:cs typeface="Verdana"/>
-              </a:rPr>
-              <a:t>T</a:t>
-            </a:r>
-            <a:r>
-              <a:rPr lang="en-US" sz="2200" kern="0" dirty="0" smtClean="0">
-                <a:ea typeface="ＭＳ Ｐゴシック" pitchFamily="34" charset="-128"/>
-                <a:cs typeface="Verdana"/>
-              </a:rPr>
-              <a:t>races and S</a:t>
-            </a:r>
-            <a:r>
-              <a:rPr lang="en-US" sz="2200" kern="0" dirty="0" smtClean="0">
-                <a:ea typeface="ＭＳ Ｐゴシック" pitchFamily="34" charset="-128"/>
-                <a:cs typeface="Verdana"/>
-              </a:rPr>
-              <a:t>imulator.</a:t>
-            </a:r>
-            <a:endParaRPr lang="en-US" sz="2200" kern="0" dirty="0" smtClean="0">
-              <a:ea typeface="ＭＳ Ｐゴシック" pitchFamily="34" charset="-128"/>
-              <a:cs typeface="Verdana"/>
-            </a:endParaRPr>
+              <a:t>contributions: Public Traces and Simulator.</a:t>
+            </a:r>
           </a:p>
           <a:p>
             <a:pPr lvl="0" fontAlgn="base">
@@ -12406,7 +12289,7 @@
     </p:spTree>
     <p:extLst>
       <p:ext uri="{BB962C8B-B14F-4D97-AF65-F5344CB8AC3E}">
-        <p14:creationId xmlns:p14="http://schemas.microsoft.com/office/powerpoint/2010/main" xmlns="" val="4048624234"/>
+        <p14:creationId xmlns="" xmlns:p14="http://schemas.microsoft.com/office/powerpoint/2010/main" val="4048624234"/>
       </p:ext>
     </p:extLst>
   </p:cSld>
@@ -12561,7 +12444,7 @@
     </p:spTree>
     <p:extLst>
       <p:ext uri="{BB962C8B-B14F-4D97-AF65-F5344CB8AC3E}">
-        <p14:creationId xmlns:p14="http://schemas.microsoft.com/office/powerpoint/2010/main" xmlns="" val="4048624234"/>
+        <p14:creationId xmlns="" xmlns:p14="http://schemas.microsoft.com/office/powerpoint/2010/main" val="4048624234"/>
       </p:ext>
     </p:extLst>
   </p:cSld>
@@ -12821,7 +12704,7 @@
     </p:spTree>
     <p:extLst>
       <p:ext uri="{BB962C8B-B14F-4D97-AF65-F5344CB8AC3E}">
-        <p14:creationId xmlns:p14="http://schemas.microsoft.com/office/powerpoint/2010/main" xmlns="" val="3227401764"/>
+        <p14:creationId xmlns="" xmlns:p14="http://schemas.microsoft.com/office/powerpoint/2010/main" val="3227401764"/>
       </p:ext>
     </p:extLst>
   </p:cSld>
@@ -13468,7 +13351,7 @@
     </p:spTree>
     <p:extLst>
       <p:ext uri="{BB962C8B-B14F-4D97-AF65-F5344CB8AC3E}">
-        <p14:creationId xmlns:p14="http://schemas.microsoft.com/office/powerpoint/2010/main" xmlns="" val="3841741436"/>
+        <p14:creationId xmlns="" xmlns:p14="http://schemas.microsoft.com/office/powerpoint/2010/main" val="3841741436"/>
       </p:ext>
     </p:extLst>
   </p:cSld>
@@ -14115,7 +13998,7 @@
     </p:spTree>
     <p:extLst>
       <p:ext uri="{BB962C8B-B14F-4D97-AF65-F5344CB8AC3E}">
-        <p14:creationId xmlns:p14="http://schemas.microsoft.com/office/powerpoint/2010/main" xmlns="" val="1337277195"/>
+        <p14:creationId xmlns="" xmlns:p14="http://schemas.microsoft.com/office/powerpoint/2010/main" val="1337277195"/>
       </p:ext>
     </p:extLst>
   </p:cSld>
@@ -14358,7 +14241,7 @@
     </p:spTree>
     <p:extLst>
       <p:ext uri="{BB962C8B-B14F-4D97-AF65-F5344CB8AC3E}">
-        <p14:creationId xmlns:p14="http://schemas.microsoft.com/office/powerpoint/2010/main" xmlns="" val="2098000347"/>
+        <p14:creationId xmlns="" xmlns:p14="http://schemas.microsoft.com/office/powerpoint/2010/main" val="2098000347"/>
       </p:ext>
     </p:extLst>
   </p:cSld>
@@ -14489,15 +14372,7 @@
                 <a:ea typeface="ＭＳ Ｐゴシック" pitchFamily="34" charset="-128"/>
                 <a:cs typeface="Verdana"/>
               </a:rPr>
-              <a:t>9– </a:t>
-            </a:r>
-            <a:r>
-              <a:rPr lang="en-US" sz="2400" kern="0" dirty="0" smtClean="0">
-                <a:latin typeface="Verdana"/>
-                <a:ea typeface="ＭＳ Ｐゴシック" pitchFamily="34" charset="-128"/>
-                <a:cs typeface="Verdana"/>
-              </a:rPr>
-              <a:t>13 million jobs each</a:t>
+              <a:t>9– 13 million jobs each</a:t>
             </a:r>
           </a:p>
           <a:p>
@@ -14518,15 +14393,7 @@
                 <a:ea typeface="ＭＳ Ｐゴシック" pitchFamily="34" charset="-128"/>
                 <a:cs typeface="Verdana"/>
               </a:rPr>
-              <a:t>One month period (November 2012</a:t>
-            </a:r>
-            <a:r>
-              <a:rPr lang="en-US" sz="2400" kern="0" dirty="0" smtClean="0">
-                <a:latin typeface="Verdana"/>
-                <a:ea typeface="ＭＳ Ｐゴシック" pitchFamily="34" charset="-128"/>
-                <a:cs typeface="Verdana"/>
-              </a:rPr>
-              <a:t>)</a:t>
+              <a:t>One month period (November 2012)</a:t>
             </a:r>
           </a:p>
           <a:p>
@@ -14609,7 +14476,7 @@
     </p:spTree>
     <p:extLst>
       <p:ext uri="{BB962C8B-B14F-4D97-AF65-F5344CB8AC3E}">
-        <p14:creationId xmlns:p14="http://schemas.microsoft.com/office/powerpoint/2010/main" xmlns="" val="1312699180"/>
+        <p14:creationId xmlns="" xmlns:p14="http://schemas.microsoft.com/office/powerpoint/2010/main" val="1312699180"/>
       </p:ext>
     </p:extLst>
   </p:cSld>
@@ -14815,7 +14682,7 @@
     </p:spTree>
     <p:extLst>
       <p:ext uri="{BB962C8B-B14F-4D97-AF65-F5344CB8AC3E}">
-        <p14:creationId xmlns:p14="http://schemas.microsoft.com/office/powerpoint/2010/main" xmlns="" val="2098000347"/>
+        <p14:creationId xmlns="" xmlns:p14="http://schemas.microsoft.com/office/powerpoint/2010/main" val="2098000347"/>
       </p:ext>
     </p:extLst>
   </p:cSld>
@@ -15048,7 +14915,7 @@
     </p:spTree>
     <p:extLst>
       <p:ext uri="{BB962C8B-B14F-4D97-AF65-F5344CB8AC3E}">
-        <p14:creationId xmlns:p14="http://schemas.microsoft.com/office/powerpoint/2010/main" xmlns="" val="2098000347"/>
+        <p14:creationId xmlns="" xmlns:p14="http://schemas.microsoft.com/office/powerpoint/2010/main" val="2098000347"/>
       </p:ext>
     </p:extLst>
   </p:cSld>

</xml_diff>

<commit_message>
more improvments to ppt
</commit_message>
<xml_diff>
--- a/Presentation.pptx
+++ b/Presentation.pptx
@@ -668,7 +668,7 @@
     </p:spTree>
     <p:extLst>
       <p:ext uri="{BB962C8B-B14F-4D97-AF65-F5344CB8AC3E}">
-        <p14:creationId xmlns="" xmlns:p14="http://schemas.microsoft.com/office/powerpoint/2010/main" val="2616020464"/>
+        <p14:creationId xmlns:p14="http://schemas.microsoft.com/office/powerpoint/2010/main" xmlns="" val="2616020464"/>
       </p:ext>
     </p:extLst>
   </p:cSld>
@@ -811,7 +811,7 @@
     </p:spTree>
     <p:extLst>
       <p:ext uri="{BB962C8B-B14F-4D97-AF65-F5344CB8AC3E}">
-        <p14:creationId xmlns="" xmlns:p14="http://schemas.microsoft.com/office/powerpoint/2010/main" val="1814285152"/>
+        <p14:creationId xmlns:p14="http://schemas.microsoft.com/office/powerpoint/2010/main" xmlns="" val="1814285152"/>
       </p:ext>
     </p:extLst>
   </p:cSld>
@@ -919,7 +919,7 @@
     </p:spTree>
     <p:extLst>
       <p:ext uri="{BB962C8B-B14F-4D97-AF65-F5344CB8AC3E}">
-        <p14:creationId xmlns="" xmlns:p14="http://schemas.microsoft.com/office/powerpoint/2010/main" val="1814285152"/>
+        <p14:creationId xmlns:p14="http://schemas.microsoft.com/office/powerpoint/2010/main" xmlns="" val="1814285152"/>
       </p:ext>
     </p:extLst>
   </p:cSld>
@@ -1004,7 +1004,7 @@
     </p:spTree>
     <p:extLst>
       <p:ext uri="{BB962C8B-B14F-4D97-AF65-F5344CB8AC3E}">
-        <p14:creationId xmlns="" xmlns:p14="http://schemas.microsoft.com/office/powerpoint/2010/main" val="2532089183"/>
+        <p14:creationId xmlns:p14="http://schemas.microsoft.com/office/powerpoint/2010/main" xmlns="" val="2532089183"/>
       </p:ext>
     </p:extLst>
   </p:cSld>
@@ -1121,7 +1121,7 @@
     </p:spTree>
     <p:extLst>
       <p:ext uri="{BB962C8B-B14F-4D97-AF65-F5344CB8AC3E}">
-        <p14:creationId xmlns="" xmlns:p14="http://schemas.microsoft.com/office/powerpoint/2010/main" val="3122826242"/>
+        <p14:creationId xmlns:p14="http://schemas.microsoft.com/office/powerpoint/2010/main" xmlns="" val="3122826242"/>
       </p:ext>
     </p:extLst>
   </p:cSld>
@@ -1210,7 +1210,7 @@
     </p:spTree>
     <p:extLst>
       <p:ext uri="{BB962C8B-B14F-4D97-AF65-F5344CB8AC3E}">
-        <p14:creationId xmlns="" xmlns:p14="http://schemas.microsoft.com/office/powerpoint/2010/main" val="4226265490"/>
+        <p14:creationId xmlns:p14="http://schemas.microsoft.com/office/powerpoint/2010/main" xmlns="" val="4226265490"/>
       </p:ext>
     </p:extLst>
   </p:cSld>
@@ -1312,7 +1312,7 @@
     </p:spTree>
     <p:extLst>
       <p:ext uri="{BB962C8B-B14F-4D97-AF65-F5344CB8AC3E}">
-        <p14:creationId xmlns="" xmlns:p14="http://schemas.microsoft.com/office/powerpoint/2010/main" val="3969599817"/>
+        <p14:creationId xmlns:p14="http://schemas.microsoft.com/office/powerpoint/2010/main" xmlns="" val="3969599817"/>
       </p:ext>
     </p:extLst>
   </p:cSld>
@@ -1416,7 +1416,7 @@
     </p:spTree>
     <p:extLst>
       <p:ext uri="{BB962C8B-B14F-4D97-AF65-F5344CB8AC3E}">
-        <p14:creationId xmlns="" xmlns:p14="http://schemas.microsoft.com/office/powerpoint/2010/main" val="1138807512"/>
+        <p14:creationId xmlns:p14="http://schemas.microsoft.com/office/powerpoint/2010/main" xmlns="" val="1138807512"/>
       </p:ext>
     </p:extLst>
   </p:cSld>
@@ -1589,7 +1589,7 @@
     </p:spTree>
     <p:extLst>
       <p:ext uri="{BB962C8B-B14F-4D97-AF65-F5344CB8AC3E}">
-        <p14:creationId xmlns="" xmlns:p14="http://schemas.microsoft.com/office/powerpoint/2010/main" val="1138807512"/>
+        <p14:creationId xmlns:p14="http://schemas.microsoft.com/office/powerpoint/2010/main" xmlns="" val="1138807512"/>
       </p:ext>
     </p:extLst>
   </p:cSld>
@@ -1721,7 +1721,7 @@
     </p:spTree>
     <p:extLst>
       <p:ext uri="{BB962C8B-B14F-4D97-AF65-F5344CB8AC3E}">
-        <p14:creationId xmlns="" xmlns:p14="http://schemas.microsoft.com/office/powerpoint/2010/main" val="4003186642"/>
+        <p14:creationId xmlns:p14="http://schemas.microsoft.com/office/powerpoint/2010/main" xmlns="" val="4003186642"/>
       </p:ext>
     </p:extLst>
   </p:cSld>
@@ -1843,7 +1843,7 @@
     </p:spTree>
     <p:extLst>
       <p:ext uri="{BB962C8B-B14F-4D97-AF65-F5344CB8AC3E}">
-        <p14:creationId xmlns="" xmlns:p14="http://schemas.microsoft.com/office/powerpoint/2010/main" val="3695432560"/>
+        <p14:creationId xmlns:p14="http://schemas.microsoft.com/office/powerpoint/2010/main" xmlns="" val="3695432560"/>
       </p:ext>
     </p:extLst>
   </p:cSld>
@@ -2052,7 +2052,7 @@
     </p:spTree>
     <p:extLst>
       <p:ext uri="{BB962C8B-B14F-4D97-AF65-F5344CB8AC3E}">
-        <p14:creationId xmlns="" xmlns:p14="http://schemas.microsoft.com/office/powerpoint/2010/main" val="3804480766"/>
+        <p14:creationId xmlns:p14="http://schemas.microsoft.com/office/powerpoint/2010/main" xmlns="" val="3804480766"/>
       </p:ext>
     </p:extLst>
   </p:cSld>
@@ -2193,7 +2193,7 @@
     </p:spTree>
     <p:extLst>
       <p:ext uri="{BB962C8B-B14F-4D97-AF65-F5344CB8AC3E}">
-        <p14:creationId xmlns="" xmlns:p14="http://schemas.microsoft.com/office/powerpoint/2010/main" val="190619522"/>
+        <p14:creationId xmlns:p14="http://schemas.microsoft.com/office/powerpoint/2010/main" xmlns="" val="190619522"/>
       </p:ext>
     </p:extLst>
   </p:cSld>
@@ -2356,7 +2356,7 @@
     </p:spTree>
     <p:extLst>
       <p:ext uri="{BB962C8B-B14F-4D97-AF65-F5344CB8AC3E}">
-        <p14:creationId xmlns="" xmlns:p14="http://schemas.microsoft.com/office/powerpoint/2010/main" val="261277375"/>
+        <p14:creationId xmlns:p14="http://schemas.microsoft.com/office/powerpoint/2010/main" xmlns="" val="261277375"/>
       </p:ext>
     </p:extLst>
   </p:cSld>
@@ -2419,8 +2419,127 @@
                 <a:ea typeface="+mn-ea"/>
                 <a:cs typeface="+mn-cs"/>
               </a:rPr>
-              <a:t>In this graphs we see…</a:t>
-            </a:r>
+              <a:t>In this graphs we see</a:t>
+            </a:r>
+            <a:r>
+              <a:rPr lang="en-US" sz="1200" b="0" i="0" u="none" strike="noStrike" kern="1200" baseline="0" dirty="0" smtClean="0">
+                <a:solidFill>
+                  <a:schemeClr val="tx1"/>
+                </a:solidFill>
+                <a:latin typeface="+mn-lt"/>
+                <a:ea typeface="+mn-ea"/>
+                <a:cs typeface="+mn-cs"/>
+              </a:rPr>
+              <a:t>…</a:t>
+            </a:r>
+          </a:p>
+          <a:p>
+            <a:r>
+              <a:rPr lang="en-US" sz="1200" b="0" i="0" u="none" strike="noStrike" kern="1200" baseline="0" dirty="0" smtClean="0">
+                <a:solidFill>
+                  <a:schemeClr val="tx1"/>
+                </a:solidFill>
+                <a:latin typeface="+mn-lt"/>
+                <a:ea typeface="+mn-ea"/>
+                <a:cs typeface="+mn-cs"/>
+              </a:rPr>
+              <a:t>Pool A – Mix Fit wins</a:t>
+            </a:r>
+          </a:p>
+          <a:p>
+            <a:r>
+              <a:rPr lang="en-US" sz="1200" b="0" i="0" u="none" strike="noStrike" kern="1200" baseline="0" dirty="0" smtClean="0">
+                <a:solidFill>
+                  <a:schemeClr val="tx1"/>
+                </a:solidFill>
+                <a:latin typeface="+mn-lt"/>
+                <a:ea typeface="+mn-ea"/>
+                <a:cs typeface="+mn-cs"/>
+              </a:rPr>
+              <a:t>Pool B BFM Wins MF because of bursts and high memory jobs (BFM was bad on pool D)</a:t>
+            </a:r>
+          </a:p>
+          <a:p>
+            <a:r>
+              <a:rPr lang="en-US" sz="1200" b="0" i="0" u="none" strike="noStrike" kern="1200" baseline="0" dirty="0" smtClean="0">
+                <a:solidFill>
+                  <a:schemeClr val="tx1"/>
+                </a:solidFill>
+                <a:latin typeface="+mn-lt"/>
+                <a:ea typeface="+mn-ea"/>
+                <a:cs typeface="+mn-cs"/>
+              </a:rPr>
+              <a:t>WFC – good only on buckets (similar to round robin in buckets)</a:t>
+            </a:r>
+          </a:p>
+          <a:p>
+            <a:r>
+              <a:rPr lang="en-US" sz="1200" b="0" i="0" u="none" strike="noStrike" kern="1200" baseline="0" dirty="0" smtClean="0">
+                <a:solidFill>
+                  <a:schemeClr val="tx1"/>
+                </a:solidFill>
+                <a:latin typeface="+mn-lt"/>
+                <a:ea typeface="+mn-ea"/>
+                <a:cs typeface="+mn-cs"/>
+              </a:rPr>
+              <a:t>Pool C – unchallenging workload</a:t>
+            </a:r>
+          </a:p>
+          <a:p>
+            <a:r>
+              <a:rPr lang="en-US" sz="1200" b="0" i="0" u="none" strike="noStrike" kern="1200" baseline="0" dirty="0" smtClean="0">
+                <a:solidFill>
+                  <a:schemeClr val="tx1"/>
+                </a:solidFill>
+                <a:latin typeface="+mn-lt"/>
+                <a:ea typeface="+mn-ea"/>
+                <a:cs typeface="+mn-cs"/>
+              </a:rPr>
+              <a:t>Pool D – non </a:t>
+            </a:r>
+            <a:r>
+              <a:rPr lang="en-US" sz="1200" b="0" i="0" u="none" strike="noStrike" kern="1200" baseline="0" dirty="0" err="1" smtClean="0">
+                <a:solidFill>
+                  <a:schemeClr val="tx1"/>
+                </a:solidFill>
+                <a:latin typeface="+mn-lt"/>
+                <a:ea typeface="+mn-ea"/>
+                <a:cs typeface="+mn-cs"/>
+              </a:rPr>
+              <a:t>bursty</a:t>
+            </a:r>
+            <a:r>
+              <a:rPr lang="en-US" sz="1200" b="0" i="0" u="none" strike="noStrike" kern="1200" baseline="0" dirty="0" smtClean="0">
+                <a:solidFill>
+                  <a:schemeClr val="tx1"/>
+                </a:solidFill>
+                <a:latin typeface="+mn-lt"/>
+                <a:ea typeface="+mn-ea"/>
+                <a:cs typeface="+mn-cs"/>
+              </a:rPr>
+              <a:t> nature (good for balancing)</a:t>
+            </a:r>
+          </a:p>
+          <a:p>
+            <a:r>
+              <a:rPr lang="en-US" sz="1200" b="0" i="0" u="none" strike="noStrike" kern="1200" baseline="0" dirty="0" smtClean="0">
+                <a:solidFill>
+                  <a:schemeClr val="tx1"/>
+                </a:solidFill>
+                <a:latin typeface="+mn-lt"/>
+                <a:ea typeface="+mn-ea"/>
+                <a:cs typeface="+mn-cs"/>
+              </a:rPr>
+              <a:t>Max Job - robust</a:t>
+            </a:r>
+            <a:endParaRPr lang="en-US" sz="1200" b="0" i="0" u="none" strike="noStrike" kern="1200" baseline="0" dirty="0" smtClean="0">
+              <a:solidFill>
+                <a:schemeClr val="tx1"/>
+              </a:solidFill>
+              <a:latin typeface="+mn-lt"/>
+              <a:ea typeface="+mn-ea"/>
+              <a:cs typeface="+mn-cs"/>
+            </a:endParaRPr>
           </a:p>
           <a:p>
             <a:endParaRPr lang="en-US" dirty="0" smtClean="0"/>
@@ -2454,7 +2573,7 @@
     </p:spTree>
     <p:extLst>
       <p:ext uri="{BB962C8B-B14F-4D97-AF65-F5344CB8AC3E}">
-        <p14:creationId xmlns="" xmlns:p14="http://schemas.microsoft.com/office/powerpoint/2010/main" val="261277375"/>
+        <p14:creationId xmlns:p14="http://schemas.microsoft.com/office/powerpoint/2010/main" xmlns="" val="261277375"/>
       </p:ext>
     </p:extLst>
   </p:cSld>
@@ -2569,7 +2688,7 @@
     </p:spTree>
     <p:extLst>
       <p:ext uri="{BB962C8B-B14F-4D97-AF65-F5344CB8AC3E}">
-        <p14:creationId xmlns="" xmlns:p14="http://schemas.microsoft.com/office/powerpoint/2010/main" val="3064807093"/>
+        <p14:creationId xmlns:p14="http://schemas.microsoft.com/office/powerpoint/2010/main" xmlns="" val="3064807093"/>
       </p:ext>
     </p:extLst>
   </p:cSld>
@@ -2654,7 +2773,7 @@
     </p:spTree>
     <p:extLst>
       <p:ext uri="{BB962C8B-B14F-4D97-AF65-F5344CB8AC3E}">
-        <p14:creationId xmlns="" xmlns:p14="http://schemas.microsoft.com/office/powerpoint/2010/main" val="3103055361"/>
+        <p14:creationId xmlns:p14="http://schemas.microsoft.com/office/powerpoint/2010/main" xmlns="" val="3103055361"/>
       </p:ext>
     </p:extLst>
   </p:cSld>
@@ -2801,7 +2920,7 @@
     </p:spTree>
     <p:extLst>
       <p:ext uri="{BB962C8B-B14F-4D97-AF65-F5344CB8AC3E}">
-        <p14:creationId xmlns="" xmlns:p14="http://schemas.microsoft.com/office/powerpoint/2010/main" val="494263274"/>
+        <p14:creationId xmlns:p14="http://schemas.microsoft.com/office/powerpoint/2010/main" xmlns="" val="494263274"/>
       </p:ext>
     </p:extLst>
   </p:cSld>
@@ -2987,7 +3106,7 @@
     </p:spTree>
     <p:extLst>
       <p:ext uri="{BB962C8B-B14F-4D97-AF65-F5344CB8AC3E}">
-        <p14:creationId xmlns="" xmlns:p14="http://schemas.microsoft.com/office/powerpoint/2010/main" val="494263274"/>
+        <p14:creationId xmlns:p14="http://schemas.microsoft.com/office/powerpoint/2010/main" xmlns="" val="494263274"/>
       </p:ext>
     </p:extLst>
   </p:cSld>
@@ -3191,7 +3310,7 @@
     </p:spTree>
     <p:extLst>
       <p:ext uri="{BB962C8B-B14F-4D97-AF65-F5344CB8AC3E}">
-        <p14:creationId xmlns="" xmlns:p14="http://schemas.microsoft.com/office/powerpoint/2010/main" val="494263274"/>
+        <p14:creationId xmlns:p14="http://schemas.microsoft.com/office/powerpoint/2010/main" xmlns="" val="494263274"/>
       </p:ext>
     </p:extLst>
   </p:cSld>
@@ -3432,7 +3551,7 @@
     </p:spTree>
     <p:extLst>
       <p:ext uri="{BB962C8B-B14F-4D97-AF65-F5344CB8AC3E}">
-        <p14:creationId xmlns="" xmlns:p14="http://schemas.microsoft.com/office/powerpoint/2010/main" val="494263274"/>
+        <p14:creationId xmlns:p14="http://schemas.microsoft.com/office/powerpoint/2010/main" xmlns="" val="494263274"/>
       </p:ext>
     </p:extLst>
   </p:cSld>
@@ -3573,7 +3692,7 @@
     </p:spTree>
     <p:extLst>
       <p:ext uri="{BB962C8B-B14F-4D97-AF65-F5344CB8AC3E}">
-        <p14:creationId xmlns="" xmlns:p14="http://schemas.microsoft.com/office/powerpoint/2010/main" val="494263274"/>
+        <p14:creationId xmlns:p14="http://schemas.microsoft.com/office/powerpoint/2010/main" xmlns="" val="494263274"/>
       </p:ext>
     </p:extLst>
   </p:cSld>
@@ -3697,7 +3816,7 @@
     </p:spTree>
     <p:extLst>
       <p:ext uri="{BB962C8B-B14F-4D97-AF65-F5344CB8AC3E}">
-        <p14:creationId xmlns="" xmlns:p14="http://schemas.microsoft.com/office/powerpoint/2010/main" val="3117802984"/>
+        <p14:creationId xmlns:p14="http://schemas.microsoft.com/office/powerpoint/2010/main" xmlns="" val="3117802984"/>
       </p:ext>
     </p:extLst>
   </p:cSld>
@@ -3889,7 +4008,7 @@
     </p:spTree>
     <p:extLst>
       <p:ext uri="{BB962C8B-B14F-4D97-AF65-F5344CB8AC3E}">
-        <p14:creationId xmlns="" xmlns:p14="http://schemas.microsoft.com/office/powerpoint/2010/main" val="1038479702"/>
+        <p14:creationId xmlns:p14="http://schemas.microsoft.com/office/powerpoint/2010/main" xmlns="" val="1038479702"/>
       </p:ext>
     </p:extLst>
   </p:cSld>
@@ -8005,7 +8124,7 @@
           <a:blip r:embed="rId3" cstate="print">
             <a:extLst>
               <a:ext uri="{28A0092B-C50C-407E-A947-70E740481C1C}">
-                <a14:useLocalDpi xmlns="" xmlns:a14="http://schemas.microsoft.com/office/drawing/2010/main" val="0"/>
+                <a14:useLocalDpi xmlns:a14="http://schemas.microsoft.com/office/drawing/2010/main" xmlns="" val="0"/>
               </a:ext>
             </a:extLst>
           </a:blip>
@@ -8029,14 +8148,14 @@
           <a:effectLst/>
           <a:extLst>
             <a:ext uri="{909E8E84-426E-40DD-AFC4-6F175D3DCCD1}">
-              <a14:hiddenFill xmlns="" xmlns:a14="http://schemas.microsoft.com/office/drawing/2010/main">
+              <a14:hiddenFill xmlns:a14="http://schemas.microsoft.com/office/drawing/2010/main" xmlns="">
                 <a:solidFill>
                   <a:schemeClr val="accent1"/>
                 </a:solidFill>
               </a14:hiddenFill>
             </a:ext>
             <a:ext uri="{91240B29-F687-4F45-9708-019B960494DF}">
-              <a14:hiddenLine xmlns="" xmlns:a14="http://schemas.microsoft.com/office/drawing/2010/main" w="9525">
+              <a14:hiddenLine xmlns:a14="http://schemas.microsoft.com/office/drawing/2010/main" xmlns="" w="9525">
                 <a:solidFill>
                   <a:schemeClr val="tx1"/>
                 </a:solidFill>
@@ -8046,7 +8165,7 @@
               </a14:hiddenLine>
             </a:ext>
             <a:ext uri="{AF507438-7753-43E0-B8FC-AC1667EBCBE1}">
-              <a14:hiddenEffects xmlns="" xmlns:a14="http://schemas.microsoft.com/office/drawing/2010/main">
+              <a14:hiddenEffects xmlns:a14="http://schemas.microsoft.com/office/drawing/2010/main" xmlns="">
                 <a:effectLst>
                   <a:outerShdw dist="35921" dir="2700000" algn="ctr" rotWithShape="0">
                     <a:schemeClr val="bg2"/>
@@ -8060,7 +8179,7 @@
     </p:spTree>
     <p:extLst>
       <p:ext uri="{BB962C8B-B14F-4D97-AF65-F5344CB8AC3E}">
-        <p14:creationId xmlns="" xmlns:p14="http://schemas.microsoft.com/office/powerpoint/2010/main" val="156881095"/>
+        <p14:creationId xmlns:p14="http://schemas.microsoft.com/office/powerpoint/2010/main" xmlns="" val="156881095"/>
       </p:ext>
     </p:extLst>
   </p:cSld>
@@ -8327,7 +8446,7 @@
           <a:blip r:embed="rId3" cstate="print">
             <a:extLst>
               <a:ext uri="{28A0092B-C50C-407E-A947-70E740481C1C}">
-                <a14:useLocalDpi xmlns="" xmlns:a14="http://schemas.microsoft.com/office/drawing/2010/main" val="0"/>
+                <a14:useLocalDpi xmlns:a14="http://schemas.microsoft.com/office/drawing/2010/main" xmlns="" val="0"/>
               </a:ext>
             </a:extLst>
           </a:blip>
@@ -8351,14 +8470,14 @@
           <a:effectLst/>
           <a:extLst>
             <a:ext uri="{909E8E84-426E-40DD-AFC4-6F175D3DCCD1}">
-              <a14:hiddenFill xmlns="" xmlns:a14="http://schemas.microsoft.com/office/drawing/2010/main">
+              <a14:hiddenFill xmlns:a14="http://schemas.microsoft.com/office/drawing/2010/main" xmlns="">
                 <a:solidFill>
                   <a:schemeClr val="accent1"/>
                 </a:solidFill>
               </a14:hiddenFill>
             </a:ext>
             <a:ext uri="{91240B29-F687-4F45-9708-019B960494DF}">
-              <a14:hiddenLine xmlns="" xmlns:a14="http://schemas.microsoft.com/office/drawing/2010/main" w="9525">
+              <a14:hiddenLine xmlns:a14="http://schemas.microsoft.com/office/drawing/2010/main" xmlns="" w="9525">
                 <a:solidFill>
                   <a:schemeClr val="tx1"/>
                 </a:solidFill>
@@ -8368,7 +8487,7 @@
               </a14:hiddenLine>
             </a:ext>
             <a:ext uri="{AF507438-7753-43E0-B8FC-AC1667EBCBE1}">
-              <a14:hiddenEffects xmlns="" xmlns:a14="http://schemas.microsoft.com/office/drawing/2010/main">
+              <a14:hiddenEffects xmlns:a14="http://schemas.microsoft.com/office/drawing/2010/main" xmlns="">
                 <a:effectLst>
                   <a:outerShdw dist="35921" dir="2700000" algn="ctr" rotWithShape="0">
                     <a:schemeClr val="bg2"/>
@@ -8382,7 +8501,7 @@
     </p:spTree>
     <p:extLst>
       <p:ext uri="{BB962C8B-B14F-4D97-AF65-F5344CB8AC3E}">
-        <p14:creationId xmlns="" xmlns:p14="http://schemas.microsoft.com/office/powerpoint/2010/main" val="1172241827"/>
+        <p14:creationId xmlns:p14="http://schemas.microsoft.com/office/powerpoint/2010/main" xmlns="" val="1172241827"/>
       </p:ext>
     </p:extLst>
   </p:cSld>
@@ -8573,7 +8692,7 @@
     </p:spTree>
     <p:extLst>
       <p:ext uri="{BB962C8B-B14F-4D97-AF65-F5344CB8AC3E}">
-        <p14:creationId xmlns="" xmlns:p14="http://schemas.microsoft.com/office/powerpoint/2010/main" val="88608496"/>
+        <p14:creationId xmlns:p14="http://schemas.microsoft.com/office/powerpoint/2010/main" xmlns="" val="88608496"/>
       </p:ext>
     </p:extLst>
   </p:cSld>
@@ -8784,7 +8903,7 @@
     </p:spTree>
     <p:extLst>
       <p:ext uri="{BB962C8B-B14F-4D97-AF65-F5344CB8AC3E}">
-        <p14:creationId xmlns="" xmlns:p14="http://schemas.microsoft.com/office/powerpoint/2010/main" val="3934171707"/>
+        <p14:creationId xmlns:p14="http://schemas.microsoft.com/office/powerpoint/2010/main" xmlns="" val="3934171707"/>
       </p:ext>
     </p:extLst>
   </p:cSld>
@@ -9004,7 +9123,7 @@
           <a:blip r:embed="rId3" cstate="print">
             <a:extLst>
               <a:ext uri="{28A0092B-C50C-407E-A947-70E740481C1C}">
-                <a14:useLocalDpi xmlns="" xmlns:a14="http://schemas.microsoft.com/office/drawing/2010/main" val="0"/>
+                <a14:useLocalDpi xmlns:a14="http://schemas.microsoft.com/office/drawing/2010/main" xmlns="" val="0"/>
               </a:ext>
             </a:extLst>
           </a:blip>
@@ -9028,14 +9147,14 @@
           <a:effectLst/>
           <a:extLst>
             <a:ext uri="{909E8E84-426E-40DD-AFC4-6F175D3DCCD1}">
-              <a14:hiddenFill xmlns="" xmlns:a14="http://schemas.microsoft.com/office/drawing/2010/main">
+              <a14:hiddenFill xmlns:a14="http://schemas.microsoft.com/office/drawing/2010/main" xmlns="">
                 <a:solidFill>
                   <a:schemeClr val="accent1"/>
                 </a:solidFill>
               </a14:hiddenFill>
             </a:ext>
             <a:ext uri="{91240B29-F687-4F45-9708-019B960494DF}">
-              <a14:hiddenLine xmlns="" xmlns:a14="http://schemas.microsoft.com/office/drawing/2010/main" w="9525">
+              <a14:hiddenLine xmlns:a14="http://schemas.microsoft.com/office/drawing/2010/main" xmlns="" w="9525">
                 <a:solidFill>
                   <a:schemeClr val="tx1"/>
                 </a:solidFill>
@@ -9045,7 +9164,7 @@
               </a14:hiddenLine>
             </a:ext>
             <a:ext uri="{AF507438-7753-43E0-B8FC-AC1667EBCBE1}">
-              <a14:hiddenEffects xmlns="" xmlns:a14="http://schemas.microsoft.com/office/drawing/2010/main">
+              <a14:hiddenEffects xmlns:a14="http://schemas.microsoft.com/office/drawing/2010/main" xmlns="">
                 <a:effectLst>
                   <a:outerShdw dist="35921" dir="2700000" algn="ctr" rotWithShape="0">
                     <a:schemeClr val="bg2"/>
@@ -9059,7 +9178,7 @@
     </p:spTree>
     <p:extLst>
       <p:ext uri="{BB962C8B-B14F-4D97-AF65-F5344CB8AC3E}">
-        <p14:creationId xmlns="" xmlns:p14="http://schemas.microsoft.com/office/powerpoint/2010/main" val="2161871131"/>
+        <p14:creationId xmlns:p14="http://schemas.microsoft.com/office/powerpoint/2010/main" xmlns="" val="2161871131"/>
       </p:ext>
     </p:extLst>
   </p:cSld>
@@ -9242,7 +9361,7 @@
     </p:spTree>
     <p:extLst>
       <p:ext uri="{BB962C8B-B14F-4D97-AF65-F5344CB8AC3E}">
-        <p14:creationId xmlns="" xmlns:p14="http://schemas.microsoft.com/office/powerpoint/2010/main" val="258686234"/>
+        <p14:creationId xmlns:p14="http://schemas.microsoft.com/office/powerpoint/2010/main" xmlns="" val="258686234"/>
       </p:ext>
     </p:extLst>
   </p:cSld>
@@ -9431,7 +9550,7 @@
           <a:blip r:embed="rId3" cstate="print">
             <a:extLst>
               <a:ext uri="{28A0092B-C50C-407E-A947-70E740481C1C}">
-                <a14:useLocalDpi xmlns="" xmlns:a14="http://schemas.microsoft.com/office/drawing/2010/main" val="0"/>
+                <a14:useLocalDpi xmlns:a14="http://schemas.microsoft.com/office/drawing/2010/main" xmlns="" val="0"/>
               </a:ext>
             </a:extLst>
           </a:blip>
@@ -9455,14 +9574,14 @@
           <a:effectLst/>
           <a:extLst>
             <a:ext uri="{909E8E84-426E-40DD-AFC4-6F175D3DCCD1}">
-              <a14:hiddenFill xmlns="" xmlns:a14="http://schemas.microsoft.com/office/drawing/2010/main">
+              <a14:hiddenFill xmlns:a14="http://schemas.microsoft.com/office/drawing/2010/main" xmlns="">
                 <a:solidFill>
                   <a:schemeClr val="accent1"/>
                 </a:solidFill>
               </a14:hiddenFill>
             </a:ext>
             <a:ext uri="{91240B29-F687-4F45-9708-019B960494DF}">
-              <a14:hiddenLine xmlns="" xmlns:a14="http://schemas.microsoft.com/office/drawing/2010/main" w="9525">
+              <a14:hiddenLine xmlns:a14="http://schemas.microsoft.com/office/drawing/2010/main" xmlns="" w="9525">
                 <a:solidFill>
                   <a:schemeClr val="tx1"/>
                 </a:solidFill>
@@ -9472,7 +9591,7 @@
               </a14:hiddenLine>
             </a:ext>
             <a:ext uri="{AF507438-7753-43E0-B8FC-AC1667EBCBE1}">
-              <a14:hiddenEffects xmlns="" xmlns:a14="http://schemas.microsoft.com/office/drawing/2010/main">
+              <a14:hiddenEffects xmlns:a14="http://schemas.microsoft.com/office/drawing/2010/main" xmlns="">
                 <a:effectLst>
                   <a:outerShdw dist="35921" dir="2700000" algn="ctr" rotWithShape="0">
                     <a:schemeClr val="bg2"/>
@@ -9486,7 +9605,7 @@
     </p:spTree>
     <p:extLst>
       <p:ext uri="{BB962C8B-B14F-4D97-AF65-F5344CB8AC3E}">
-        <p14:creationId xmlns="" xmlns:p14="http://schemas.microsoft.com/office/powerpoint/2010/main" val="1549667041"/>
+        <p14:creationId xmlns:p14="http://schemas.microsoft.com/office/powerpoint/2010/main" xmlns="" val="1549667041"/>
       </p:ext>
     </p:extLst>
   </p:cSld>
@@ -9675,7 +9794,7 @@
     </p:spTree>
     <p:extLst>
       <p:ext uri="{BB962C8B-B14F-4D97-AF65-F5344CB8AC3E}">
-        <p14:creationId xmlns="" xmlns:p14="http://schemas.microsoft.com/office/powerpoint/2010/main" val="1193325034"/>
+        <p14:creationId xmlns:p14="http://schemas.microsoft.com/office/powerpoint/2010/main" xmlns="" val="1193325034"/>
       </p:ext>
     </p:extLst>
   </p:cSld>
@@ -9877,7 +9996,7 @@
     </p:spTree>
     <p:extLst>
       <p:ext uri="{BB962C8B-B14F-4D97-AF65-F5344CB8AC3E}">
-        <p14:creationId xmlns="" xmlns:p14="http://schemas.microsoft.com/office/powerpoint/2010/main" val="3495113006"/>
+        <p14:creationId xmlns:p14="http://schemas.microsoft.com/office/powerpoint/2010/main" xmlns="" val="3495113006"/>
       </p:ext>
     </p:extLst>
   </p:cSld>
@@ -10060,7 +10179,7 @@
     </p:spTree>
     <p:extLst>
       <p:ext uri="{BB962C8B-B14F-4D97-AF65-F5344CB8AC3E}">
-        <p14:creationId xmlns="" xmlns:p14="http://schemas.microsoft.com/office/powerpoint/2010/main" val="1193325034"/>
+        <p14:creationId xmlns:p14="http://schemas.microsoft.com/office/powerpoint/2010/main" xmlns="" val="1193325034"/>
       </p:ext>
     </p:extLst>
   </p:cSld>
@@ -10411,7 +10530,7 @@
     </p:spTree>
     <p:extLst>
       <p:ext uri="{BB962C8B-B14F-4D97-AF65-F5344CB8AC3E}">
-        <p14:creationId xmlns="" xmlns:p14="http://schemas.microsoft.com/office/powerpoint/2010/main" val="1352295260"/>
+        <p14:creationId xmlns:p14="http://schemas.microsoft.com/office/powerpoint/2010/main" xmlns="" val="1352295260"/>
       </p:ext>
     </p:extLst>
   </p:cSld>
@@ -10597,7 +10716,7 @@
           <a:blip r:embed="rId3" cstate="print">
             <a:extLst>
               <a:ext uri="{28A0092B-C50C-407E-A947-70E740481C1C}">
-                <a14:useLocalDpi xmlns="" xmlns:a14="http://schemas.microsoft.com/office/drawing/2010/main" val="0"/>
+                <a14:useLocalDpi xmlns:a14="http://schemas.microsoft.com/office/drawing/2010/main" xmlns="" val="0"/>
               </a:ext>
             </a:extLst>
           </a:blip>
@@ -10621,14 +10740,14 @@
           <a:effectLst/>
           <a:extLst>
             <a:ext uri="{909E8E84-426E-40DD-AFC4-6F175D3DCCD1}">
-              <a14:hiddenFill xmlns="" xmlns:a14="http://schemas.microsoft.com/office/drawing/2010/main">
+              <a14:hiddenFill xmlns:a14="http://schemas.microsoft.com/office/drawing/2010/main" xmlns="">
                 <a:solidFill>
                   <a:schemeClr val="accent1"/>
                 </a:solidFill>
               </a14:hiddenFill>
             </a:ext>
             <a:ext uri="{91240B29-F687-4F45-9708-019B960494DF}">
-              <a14:hiddenLine xmlns="" xmlns:a14="http://schemas.microsoft.com/office/drawing/2010/main" w="9525">
+              <a14:hiddenLine xmlns:a14="http://schemas.microsoft.com/office/drawing/2010/main" xmlns="" w="9525">
                 <a:solidFill>
                   <a:schemeClr val="tx1"/>
                 </a:solidFill>
@@ -10638,7 +10757,7 @@
               </a14:hiddenLine>
             </a:ext>
             <a:ext uri="{AF507438-7753-43E0-B8FC-AC1667EBCBE1}">
-              <a14:hiddenEffects xmlns="" xmlns:a14="http://schemas.microsoft.com/office/drawing/2010/main">
+              <a14:hiddenEffects xmlns:a14="http://schemas.microsoft.com/office/drawing/2010/main" xmlns="">
                 <a:effectLst>
                   <a:outerShdw dist="35921" dir="2700000" algn="ctr" rotWithShape="0">
                     <a:schemeClr val="bg2"/>
@@ -10652,7 +10771,7 @@
     </p:spTree>
     <p:extLst>
       <p:ext uri="{BB962C8B-B14F-4D97-AF65-F5344CB8AC3E}">
-        <p14:creationId xmlns="" xmlns:p14="http://schemas.microsoft.com/office/powerpoint/2010/main" val="1990835183"/>
+        <p14:creationId xmlns:p14="http://schemas.microsoft.com/office/powerpoint/2010/main" xmlns="" val="1990835183"/>
       </p:ext>
     </p:extLst>
   </p:cSld>
@@ -10835,7 +10954,7 @@
     </p:spTree>
     <p:extLst>
       <p:ext uri="{BB962C8B-B14F-4D97-AF65-F5344CB8AC3E}">
-        <p14:creationId xmlns="" xmlns:p14="http://schemas.microsoft.com/office/powerpoint/2010/main" val="537376198"/>
+        <p14:creationId xmlns:p14="http://schemas.microsoft.com/office/powerpoint/2010/main" xmlns="" val="537376198"/>
       </p:ext>
     </p:extLst>
   </p:cSld>
@@ -11272,7 +11391,7 @@
     </p:spTree>
     <p:extLst>
       <p:ext uri="{BB962C8B-B14F-4D97-AF65-F5344CB8AC3E}">
-        <p14:creationId xmlns="" xmlns:p14="http://schemas.microsoft.com/office/powerpoint/2010/main" val="2627711932"/>
+        <p14:creationId xmlns:p14="http://schemas.microsoft.com/office/powerpoint/2010/main" xmlns="" val="2627711932"/>
       </p:ext>
     </p:extLst>
   </p:cSld>
@@ -11536,7 +11655,7 @@
     </p:spTree>
     <p:extLst>
       <p:ext uri="{BB962C8B-B14F-4D97-AF65-F5344CB8AC3E}">
-        <p14:creationId xmlns="" xmlns:p14="http://schemas.microsoft.com/office/powerpoint/2010/main" val="537376198"/>
+        <p14:creationId xmlns:p14="http://schemas.microsoft.com/office/powerpoint/2010/main" xmlns="" val="537376198"/>
       </p:ext>
     </p:extLst>
   </p:cSld>
@@ -11669,7 +11788,7 @@
           <a:blip r:embed="rId3" cstate="print">
             <a:extLst>
               <a:ext uri="{28A0092B-C50C-407E-A947-70E740481C1C}">
-                <a14:useLocalDpi xmlns="" xmlns:a14="http://schemas.microsoft.com/office/drawing/2010/main" val="0"/>
+                <a14:useLocalDpi xmlns:a14="http://schemas.microsoft.com/office/drawing/2010/main" xmlns="" val="0"/>
               </a:ext>
             </a:extLst>
           </a:blip>
@@ -11693,14 +11812,14 @@
           <a:effectLst/>
           <a:extLst>
             <a:ext uri="{909E8E84-426E-40DD-AFC4-6F175D3DCCD1}">
-              <a14:hiddenFill xmlns="" xmlns:a14="http://schemas.microsoft.com/office/drawing/2010/main">
+              <a14:hiddenFill xmlns:a14="http://schemas.microsoft.com/office/drawing/2010/main" xmlns="">
                 <a:solidFill>
                   <a:schemeClr val="accent1"/>
                 </a:solidFill>
               </a14:hiddenFill>
             </a:ext>
             <a:ext uri="{91240B29-F687-4F45-9708-019B960494DF}">
-              <a14:hiddenLine xmlns="" xmlns:a14="http://schemas.microsoft.com/office/drawing/2010/main" w="9525">
+              <a14:hiddenLine xmlns:a14="http://schemas.microsoft.com/office/drawing/2010/main" xmlns="" w="9525">
                 <a:solidFill>
                   <a:schemeClr val="tx1"/>
                 </a:solidFill>
@@ -11710,7 +11829,7 @@
               </a14:hiddenLine>
             </a:ext>
             <a:ext uri="{AF507438-7753-43E0-B8FC-AC1667EBCBE1}">
-              <a14:hiddenEffects xmlns="" xmlns:a14="http://schemas.microsoft.com/office/drawing/2010/main">
+              <a14:hiddenEffects xmlns:a14="http://schemas.microsoft.com/office/drawing/2010/main" xmlns="">
                 <a:effectLst>
                   <a:outerShdw dist="35921" dir="2700000" algn="ctr" rotWithShape="0">
                     <a:schemeClr val="bg2"/>
@@ -11724,7 +11843,7 @@
     </p:spTree>
     <p:extLst>
       <p:ext uri="{BB962C8B-B14F-4D97-AF65-F5344CB8AC3E}">
-        <p14:creationId xmlns="" xmlns:p14="http://schemas.microsoft.com/office/powerpoint/2010/main" val="496337132"/>
+        <p14:creationId xmlns:p14="http://schemas.microsoft.com/office/powerpoint/2010/main" xmlns="" val="496337132"/>
       </p:ext>
     </p:extLst>
   </p:cSld>
@@ -11857,7 +11976,7 @@
           <a:blip r:embed="rId3" cstate="print">
             <a:extLst>
               <a:ext uri="{28A0092B-C50C-407E-A947-70E740481C1C}">
-                <a14:useLocalDpi xmlns="" xmlns:a14="http://schemas.microsoft.com/office/drawing/2010/main" val="0"/>
+                <a14:useLocalDpi xmlns:a14="http://schemas.microsoft.com/office/drawing/2010/main" xmlns="" val="0"/>
               </a:ext>
             </a:extLst>
           </a:blip>
@@ -11881,14 +12000,14 @@
           <a:effectLst/>
           <a:extLst>
             <a:ext uri="{909E8E84-426E-40DD-AFC4-6F175D3DCCD1}">
-              <a14:hiddenFill xmlns="" xmlns:a14="http://schemas.microsoft.com/office/drawing/2010/main">
+              <a14:hiddenFill xmlns:a14="http://schemas.microsoft.com/office/drawing/2010/main" xmlns="">
                 <a:solidFill>
                   <a:schemeClr val="accent1"/>
                 </a:solidFill>
               </a14:hiddenFill>
             </a:ext>
             <a:ext uri="{91240B29-F687-4F45-9708-019B960494DF}">
-              <a14:hiddenLine xmlns="" xmlns:a14="http://schemas.microsoft.com/office/drawing/2010/main" w="9525">
+              <a14:hiddenLine xmlns:a14="http://schemas.microsoft.com/office/drawing/2010/main" xmlns="" w="9525">
                 <a:solidFill>
                   <a:schemeClr val="tx1"/>
                 </a:solidFill>
@@ -11898,7 +12017,7 @@
               </a14:hiddenLine>
             </a:ext>
             <a:ext uri="{AF507438-7753-43E0-B8FC-AC1667EBCBE1}">
-              <a14:hiddenEffects xmlns="" xmlns:a14="http://schemas.microsoft.com/office/drawing/2010/main">
+              <a14:hiddenEffects xmlns:a14="http://schemas.microsoft.com/office/drawing/2010/main" xmlns="">
                 <a:effectLst>
                   <a:outerShdw dist="35921" dir="2700000" algn="ctr" rotWithShape="0">
                     <a:schemeClr val="bg2"/>
@@ -11912,7 +12031,7 @@
     </p:spTree>
     <p:extLst>
       <p:ext uri="{BB962C8B-B14F-4D97-AF65-F5344CB8AC3E}">
-        <p14:creationId xmlns="" xmlns:p14="http://schemas.microsoft.com/office/powerpoint/2010/main" val="300159156"/>
+        <p14:creationId xmlns:p14="http://schemas.microsoft.com/office/powerpoint/2010/main" xmlns="" val="300159156"/>
       </p:ext>
     </p:extLst>
   </p:cSld>
@@ -11989,7 +12108,19 @@
           <a:p>
             <a:r>
               <a:rPr lang="en-US" dirty="0" smtClean="0"/>
-              <a:t>Vector bin-packing problem: allocating virtual machines to physical servers (virtual machine placement problem) </a:t>
+              <a:t>Vector bin-packing problem: </a:t>
+            </a:r>
+            <a:endParaRPr lang="en-US" dirty="0" smtClean="0"/>
+          </a:p>
+          <a:p>
+            <a:pPr lvl="1"/>
+            <a:r>
+              <a:rPr lang="en-US" dirty="0" smtClean="0"/>
+              <a:t>allocating </a:t>
+            </a:r>
+            <a:r>
+              <a:rPr lang="en-US" dirty="0" smtClean="0"/>
+              <a:t>virtual machines to physical servers (virtual machine placement problem) </a:t>
             </a:r>
             <a:r>
               <a:rPr lang="en-US" i="1" dirty="0" err="1" smtClean="0"/>
@@ -12017,6 +12148,10 @@
               <a:rPr lang="en-US" dirty="0" smtClean="0"/>
               <a:t>Meta-schedulers: </a:t>
             </a:r>
+            <a:endParaRPr lang="en-US" dirty="0" smtClean="0"/>
+          </a:p>
+          <a:p>
+            <a:pPr lvl="1"/>
             <a:r>
               <a:rPr lang="en-US" i="1" dirty="0" smtClean="0"/>
               <a:t>David </a:t>
@@ -12250,14 +12385,7 @@
                 <a:ea typeface="ＭＳ Ｐゴシック" pitchFamily="34" charset="-128"/>
                 <a:cs typeface="Verdana"/>
               </a:rPr>
-              <a:t>Other </a:t>
-            </a:r>
-            <a:r>
-              <a:rPr lang="en-US" sz="2200" kern="0" dirty="0" smtClean="0">
-                <a:ea typeface="ＭＳ Ｐゴシック" pitchFamily="34" charset="-128"/>
-                <a:cs typeface="Verdana"/>
-              </a:rPr>
-              <a:t>contributions: Public Traces and Simulator.</a:t>
+              <a:t>Other contributions: Public Traces and Simulator.</a:t>
             </a:r>
           </a:p>
           <a:p>
@@ -12289,7 +12417,7 @@
     </p:spTree>
     <p:extLst>
       <p:ext uri="{BB962C8B-B14F-4D97-AF65-F5344CB8AC3E}">
-        <p14:creationId xmlns="" xmlns:p14="http://schemas.microsoft.com/office/powerpoint/2010/main" val="4048624234"/>
+        <p14:creationId xmlns:p14="http://schemas.microsoft.com/office/powerpoint/2010/main" xmlns="" val="4048624234"/>
       </p:ext>
     </p:extLst>
   </p:cSld>
@@ -12444,7 +12572,7 @@
     </p:spTree>
     <p:extLst>
       <p:ext uri="{BB962C8B-B14F-4D97-AF65-F5344CB8AC3E}">
-        <p14:creationId xmlns="" xmlns:p14="http://schemas.microsoft.com/office/powerpoint/2010/main" val="4048624234"/>
+        <p14:creationId xmlns:p14="http://schemas.microsoft.com/office/powerpoint/2010/main" xmlns="" val="4048624234"/>
       </p:ext>
     </p:extLst>
   </p:cSld>
@@ -12704,7 +12832,7 @@
     </p:spTree>
     <p:extLst>
       <p:ext uri="{BB962C8B-B14F-4D97-AF65-F5344CB8AC3E}">
-        <p14:creationId xmlns="" xmlns:p14="http://schemas.microsoft.com/office/powerpoint/2010/main" val="3227401764"/>
+        <p14:creationId xmlns:p14="http://schemas.microsoft.com/office/powerpoint/2010/main" xmlns="" val="3227401764"/>
       </p:ext>
     </p:extLst>
   </p:cSld>
@@ -13351,7 +13479,7 @@
     </p:spTree>
     <p:extLst>
       <p:ext uri="{BB962C8B-B14F-4D97-AF65-F5344CB8AC3E}">
-        <p14:creationId xmlns="" xmlns:p14="http://schemas.microsoft.com/office/powerpoint/2010/main" val="3841741436"/>
+        <p14:creationId xmlns:p14="http://schemas.microsoft.com/office/powerpoint/2010/main" xmlns="" val="3841741436"/>
       </p:ext>
     </p:extLst>
   </p:cSld>
@@ -13998,7 +14126,7 @@
     </p:spTree>
     <p:extLst>
       <p:ext uri="{BB962C8B-B14F-4D97-AF65-F5344CB8AC3E}">
-        <p14:creationId xmlns="" xmlns:p14="http://schemas.microsoft.com/office/powerpoint/2010/main" val="1337277195"/>
+        <p14:creationId xmlns:p14="http://schemas.microsoft.com/office/powerpoint/2010/main" xmlns="" val="1337277195"/>
       </p:ext>
     </p:extLst>
   </p:cSld>
@@ -14241,7 +14369,7 @@
     </p:spTree>
     <p:extLst>
       <p:ext uri="{BB962C8B-B14F-4D97-AF65-F5344CB8AC3E}">
-        <p14:creationId xmlns="" xmlns:p14="http://schemas.microsoft.com/office/powerpoint/2010/main" val="2098000347"/>
+        <p14:creationId xmlns:p14="http://schemas.microsoft.com/office/powerpoint/2010/main" xmlns="" val="2098000347"/>
       </p:ext>
     </p:extLst>
   </p:cSld>
@@ -14476,7 +14604,7 @@
     </p:spTree>
     <p:extLst>
       <p:ext uri="{BB962C8B-B14F-4D97-AF65-F5344CB8AC3E}">
-        <p14:creationId xmlns="" xmlns:p14="http://schemas.microsoft.com/office/powerpoint/2010/main" val="1312699180"/>
+        <p14:creationId xmlns:p14="http://schemas.microsoft.com/office/powerpoint/2010/main" xmlns="" val="1312699180"/>
       </p:ext>
     </p:extLst>
   </p:cSld>
@@ -14682,7 +14810,7 @@
     </p:spTree>
     <p:extLst>
       <p:ext uri="{BB962C8B-B14F-4D97-AF65-F5344CB8AC3E}">
-        <p14:creationId xmlns="" xmlns:p14="http://schemas.microsoft.com/office/powerpoint/2010/main" val="2098000347"/>
+        <p14:creationId xmlns:p14="http://schemas.microsoft.com/office/powerpoint/2010/main" xmlns="" val="2098000347"/>
       </p:ext>
     </p:extLst>
   </p:cSld>
@@ -14915,7 +15043,7 @@
     </p:spTree>
     <p:extLst>
       <p:ext uri="{BB962C8B-B14F-4D97-AF65-F5344CB8AC3E}">
-        <p14:creationId xmlns="" xmlns:p14="http://schemas.microsoft.com/office/powerpoint/2010/main" val="2098000347"/>
+        <p14:creationId xmlns:p14="http://schemas.microsoft.com/office/powerpoint/2010/main" xmlns="" val="2098000347"/>
       </p:ext>
     </p:extLst>
   </p:cSld>

</xml_diff>